<commit_message>
[master] updated lesson 10
</commit_message>
<xml_diff>
--- a/lab_09-authentication/lab_09-authentication.pptx
+++ b/lab_09-authentication/lab_09-authentication.pptx
@@ -221,7 +221,7 @@
           <a:p>
             <a:fld id="{81C4B3FE-0320-8142-8396-5C3025C019EC}" type="datetimeFigureOut">
               <a:rPr lang="en-IT" smtClean="0"/>
-              <a:t>05/05/23</a:t>
+              <a:t>07/05/23</a:t>
             </a:fld>
             <a:endParaRPr lang="en-IT"/>
           </a:p>
@@ -5540,7 +5540,7 @@
               <a:rPr lang="en-IT" b="1" dirty="0">
                 <a:latin typeface="Palatino Linotype" panose="02040502050505030304" pitchFamily="18" charset="0"/>
               </a:rPr>
-              <a:t>Only if you are using your device</a:t>
+              <a:t>Only if you are using your physical device</a:t>
             </a:r>
           </a:p>
         </p:txBody>
@@ -7793,7 +7793,7 @@
           <a:p>
             <a:r>
               <a:rPr lang="en-IT" dirty="0"/>
-              <a:t>HTTP Status Codes</a:t>
+              <a:t>IMPACT documentation</a:t>
             </a:r>
           </a:p>
           <a:p>
@@ -7801,6 +7801,28 @@
             <a:r>
               <a:rPr lang="en-GB" dirty="0">
                 <a:hlinkClick r:id="rId2"/>
+              </a:rPr>
+              <a:t>https://impact.dei.unipd.it/bwthw/docs/swagger/</a:t>
+            </a:r>
+            <a:r>
+              <a:rPr lang="en-IT" dirty="0"/>
+              <a:t> </a:t>
+            </a:r>
+          </a:p>
+          <a:p>
+            <a:endParaRPr lang="en-IT" dirty="0"/>
+          </a:p>
+          <a:p>
+            <a:r>
+              <a:rPr lang="en-IT" dirty="0"/>
+              <a:t>HTTP Status Codes</a:t>
+            </a:r>
+          </a:p>
+          <a:p>
+            <a:pPr lvl="1"/>
+            <a:r>
+              <a:rPr lang="en-GB" dirty="0">
+                <a:hlinkClick r:id="rId3"/>
               </a:rPr>
               <a:t>https://en.wikipedia.org/wiki/List_of_HTTP_status_codes</a:t>
             </a:r>
@@ -7822,7 +7844,7 @@
             <a:pPr lvl="1"/>
             <a:r>
               <a:rPr lang="en-GB" dirty="0">
-                <a:hlinkClick r:id="rId3"/>
+                <a:hlinkClick r:id="rId4"/>
               </a:rPr>
               <a:t>https://docs.flutter.dev/cookbook/networking/fetch-data</a:t>
             </a:r>
@@ -7842,7 +7864,7 @@
             <a:pPr lvl="1"/>
             <a:r>
               <a:rPr lang="en-GB" dirty="0">
-                <a:hlinkClick r:id="rId4"/>
+                <a:hlinkClick r:id="rId5"/>
               </a:rPr>
               <a:t>https://docs.flutter.dev/cookbook/networking/send-data</a:t>
             </a:r>

</xml_diff>

<commit_message>
[master] updated lab 9
</commit_message>
<xml_diff>
--- a/lab_09-authentication/lab_09-authentication.pptx
+++ b/lab_09-authentication/lab_09-authentication.pptx
@@ -5,7 +5,7 @@
     <p:sldMasterId id="2147483648" r:id="rId1"/>
   </p:sldMasterIdLst>
   <p:notesMasterIdLst>
-    <p:notesMasterId r:id="rId27"/>
+    <p:notesMasterId r:id="rId26"/>
   </p:notesMasterIdLst>
   <p:sldIdLst>
     <p:sldId id="259" r:id="rId2"/>
@@ -15,24 +15,23 @@
     <p:sldId id="399" r:id="rId6"/>
     <p:sldId id="402" r:id="rId7"/>
     <p:sldId id="400" r:id="rId8"/>
-    <p:sldId id="401" r:id="rId9"/>
-    <p:sldId id="375" r:id="rId10"/>
-    <p:sldId id="367" r:id="rId11"/>
-    <p:sldId id="370" r:id="rId12"/>
-    <p:sldId id="376" r:id="rId13"/>
-    <p:sldId id="368" r:id="rId14"/>
-    <p:sldId id="403" r:id="rId15"/>
-    <p:sldId id="404" r:id="rId16"/>
-    <p:sldId id="405" r:id="rId17"/>
-    <p:sldId id="372" r:id="rId18"/>
-    <p:sldId id="373" r:id="rId19"/>
-    <p:sldId id="366" r:id="rId20"/>
-    <p:sldId id="377" r:id="rId21"/>
-    <p:sldId id="406" r:id="rId22"/>
-    <p:sldId id="378" r:id="rId23"/>
-    <p:sldId id="303" r:id="rId24"/>
-    <p:sldId id="379" r:id="rId25"/>
-    <p:sldId id="309" r:id="rId26"/>
+    <p:sldId id="375" r:id="rId9"/>
+    <p:sldId id="367" r:id="rId10"/>
+    <p:sldId id="370" r:id="rId11"/>
+    <p:sldId id="376" r:id="rId12"/>
+    <p:sldId id="368" r:id="rId13"/>
+    <p:sldId id="403" r:id="rId14"/>
+    <p:sldId id="404" r:id="rId15"/>
+    <p:sldId id="405" r:id="rId16"/>
+    <p:sldId id="372" r:id="rId17"/>
+    <p:sldId id="373" r:id="rId18"/>
+    <p:sldId id="366" r:id="rId19"/>
+    <p:sldId id="377" r:id="rId20"/>
+    <p:sldId id="406" r:id="rId21"/>
+    <p:sldId id="378" r:id="rId22"/>
+    <p:sldId id="303" r:id="rId23"/>
+    <p:sldId id="379" r:id="rId24"/>
+    <p:sldId id="309" r:id="rId25"/>
   </p:sldIdLst>
   <p:sldSz cx="12192000" cy="6858000"/>
   <p:notesSz cx="6858000" cy="9144000"/>
@@ -221,7 +220,7 @@
           <a:p>
             <a:fld id="{81C4B3FE-0320-8142-8396-5C3025C019EC}" type="datetimeFigureOut">
               <a:rPr lang="en-IT" smtClean="0"/>
-              <a:t>07/05/23</a:t>
+              <a:t>4/28/24</a:t>
             </a:fld>
             <a:endParaRPr lang="en-IT"/>
           </a:p>
@@ -647,7 +646,7 @@
     </p:spTree>
     <p:extLst>
       <p:ext uri="{BB962C8B-B14F-4D97-AF65-F5344CB8AC3E}">
-        <p14:creationId xmlns:p14="http://schemas.microsoft.com/office/powerpoint/2010/main" val="1873110829"/>
+        <p14:creationId xmlns:p14="http://schemas.microsoft.com/office/powerpoint/2010/main" val="945353288"/>
       </p:ext>
     </p:extLst>
   </p:cSld>
@@ -731,7 +730,7 @@
     </p:spTree>
     <p:extLst>
       <p:ext uri="{BB962C8B-B14F-4D97-AF65-F5344CB8AC3E}">
-        <p14:creationId xmlns:p14="http://schemas.microsoft.com/office/powerpoint/2010/main" val="945353288"/>
+        <p14:creationId xmlns:p14="http://schemas.microsoft.com/office/powerpoint/2010/main" val="3556651451"/>
       </p:ext>
     </p:extLst>
   </p:cSld>
@@ -815,7 +814,7 @@
     </p:spTree>
     <p:extLst>
       <p:ext uri="{BB962C8B-B14F-4D97-AF65-F5344CB8AC3E}">
-        <p14:creationId xmlns:p14="http://schemas.microsoft.com/office/powerpoint/2010/main" val="3556651451"/>
+        <p14:creationId xmlns:p14="http://schemas.microsoft.com/office/powerpoint/2010/main" val="1905195391"/>
       </p:ext>
     </p:extLst>
   </p:cSld>
@@ -899,7 +898,7 @@
     </p:spTree>
     <p:extLst>
       <p:ext uri="{BB962C8B-B14F-4D97-AF65-F5344CB8AC3E}">
-        <p14:creationId xmlns:p14="http://schemas.microsoft.com/office/powerpoint/2010/main" val="1905195391"/>
+        <p14:creationId xmlns:p14="http://schemas.microsoft.com/office/powerpoint/2010/main" val="858081103"/>
       </p:ext>
     </p:extLst>
   </p:cSld>
@@ -983,7 +982,7 @@
     </p:spTree>
     <p:extLst>
       <p:ext uri="{BB962C8B-B14F-4D97-AF65-F5344CB8AC3E}">
-        <p14:creationId xmlns:p14="http://schemas.microsoft.com/office/powerpoint/2010/main" val="858081103"/>
+        <p14:creationId xmlns:p14="http://schemas.microsoft.com/office/powerpoint/2010/main" val="2967394440"/>
       </p:ext>
     </p:extLst>
   </p:cSld>
@@ -1059,90 +1058,6 @@
             <a:fld id="{CC0F43FB-3F33-3F4B-9768-2FBED988F992}" type="slidenum">
               <a:rPr lang="en-IT" smtClean="0"/>
               <a:t>18</a:t>
-            </a:fld>
-            <a:endParaRPr lang="en-IT"/>
-          </a:p>
-        </p:txBody>
-      </p:sp>
-    </p:spTree>
-    <p:extLst>
-      <p:ext uri="{BB962C8B-B14F-4D97-AF65-F5344CB8AC3E}">
-        <p14:creationId xmlns:p14="http://schemas.microsoft.com/office/powerpoint/2010/main" val="2967394440"/>
-      </p:ext>
-    </p:extLst>
-  </p:cSld>
-  <p:clrMapOvr>
-    <a:masterClrMapping/>
-  </p:clrMapOvr>
-</p:notes>
-</file>
-
-<file path=ppt/notesSlides/notesSlide16.xml><?xml version="1.0" encoding="utf-8"?>
-<p:notes xmlns:a="http://schemas.openxmlformats.org/drawingml/2006/main" xmlns:r="http://schemas.openxmlformats.org/officeDocument/2006/relationships" xmlns:p="http://schemas.openxmlformats.org/presentationml/2006/main">
-  <p:cSld>
-    <p:spTree>
-      <p:nvGrpSpPr>
-        <p:cNvPr id="1" name=""/>
-        <p:cNvGrpSpPr/>
-        <p:nvPr/>
-      </p:nvGrpSpPr>
-      <p:grpSpPr>
-        <a:xfrm>
-          <a:off x="0" y="0"/>
-          <a:ext cx="0" cy="0"/>
-          <a:chOff x="0" y="0"/>
-          <a:chExt cx="0" cy="0"/>
-        </a:xfrm>
-      </p:grpSpPr>
-      <p:sp>
-        <p:nvSpPr>
-          <p:cNvPr id="2" name="Slide Image Placeholder 1"/>
-          <p:cNvSpPr>
-            <a:spLocks noGrp="1" noRot="1" noChangeAspect="1"/>
-          </p:cNvSpPr>
-          <p:nvPr>
-            <p:ph type="sldImg"/>
-          </p:nvPr>
-        </p:nvSpPr>
-        <p:spPr/>
-      </p:sp>
-      <p:sp>
-        <p:nvSpPr>
-          <p:cNvPr id="3" name="Notes Placeholder 2"/>
-          <p:cNvSpPr>
-            <a:spLocks noGrp="1"/>
-          </p:cNvSpPr>
-          <p:nvPr>
-            <p:ph type="body" idx="1"/>
-          </p:nvPr>
-        </p:nvSpPr>
-        <p:spPr/>
-        <p:txBody>
-          <a:bodyPr/>
-          <a:lstStyle/>
-          <a:p>
-            <a:endParaRPr lang="en-IT" dirty="0"/>
-          </a:p>
-        </p:txBody>
-      </p:sp>
-      <p:sp>
-        <p:nvSpPr>
-          <p:cNvPr id="4" name="Slide Number Placeholder 3"/>
-          <p:cNvSpPr>
-            <a:spLocks noGrp="1"/>
-          </p:cNvSpPr>
-          <p:nvPr>
-            <p:ph type="sldNum" sz="quarter" idx="5"/>
-          </p:nvPr>
-        </p:nvSpPr>
-        <p:spPr/>
-        <p:txBody>
-          <a:bodyPr/>
-          <a:lstStyle/>
-          <a:p>
-            <a:fld id="{CC0F43FB-3F33-3F4B-9768-2FBED988F992}" type="slidenum">
-              <a:rPr lang="en-IT" smtClean="0"/>
-              <a:t>19</a:t>
             </a:fld>
             <a:endParaRPr lang="en-IT"/>
           </a:p>
@@ -1571,7 +1486,7 @@
     </p:spTree>
     <p:extLst>
       <p:ext uri="{BB962C8B-B14F-4D97-AF65-F5344CB8AC3E}">
-        <p14:creationId xmlns:p14="http://schemas.microsoft.com/office/powerpoint/2010/main" val="1274816175"/>
+        <p14:creationId xmlns:p14="http://schemas.microsoft.com/office/powerpoint/2010/main" val="1885243282"/>
       </p:ext>
     </p:extLst>
   </p:cSld>
@@ -1655,7 +1570,7 @@
     </p:spTree>
     <p:extLst>
       <p:ext uri="{BB962C8B-B14F-4D97-AF65-F5344CB8AC3E}">
-        <p14:creationId xmlns:p14="http://schemas.microsoft.com/office/powerpoint/2010/main" val="1885243282"/>
+        <p14:creationId xmlns:p14="http://schemas.microsoft.com/office/powerpoint/2010/main" val="91623277"/>
       </p:ext>
     </p:extLst>
   </p:cSld>
@@ -1739,7 +1654,7 @@
     </p:spTree>
     <p:extLst>
       <p:ext uri="{BB962C8B-B14F-4D97-AF65-F5344CB8AC3E}">
-        <p14:creationId xmlns:p14="http://schemas.microsoft.com/office/powerpoint/2010/main" val="91623277"/>
+        <p14:creationId xmlns:p14="http://schemas.microsoft.com/office/powerpoint/2010/main" val="3095479465"/>
       </p:ext>
     </p:extLst>
   </p:cSld>
@@ -1814,7 +1729,7 @@
           <a:p>
             <a:fld id="{CC0F43FB-3F33-3F4B-9768-2FBED988F992}" type="slidenum">
               <a:rPr lang="en-IT" smtClean="0"/>
-              <a:t>11</a:t>
+              <a:t>12</a:t>
             </a:fld>
             <a:endParaRPr lang="en-IT"/>
           </a:p>
@@ -1823,7 +1738,7 @@
     </p:spTree>
     <p:extLst>
       <p:ext uri="{BB962C8B-B14F-4D97-AF65-F5344CB8AC3E}">
-        <p14:creationId xmlns:p14="http://schemas.microsoft.com/office/powerpoint/2010/main" val="3095479465"/>
+        <p14:creationId xmlns:p14="http://schemas.microsoft.com/office/powerpoint/2010/main" val="1873110829"/>
       </p:ext>
     </p:extLst>
   </p:cSld>
@@ -3891,241 +3806,6 @@
       </p:sp>
       <p:sp>
         <p:nvSpPr>
-          <p:cNvPr id="26" name="Content Placeholder 2">
-            <a:extLst>
-              <a:ext uri="{FF2B5EF4-FFF2-40B4-BE49-F238E27FC236}">
-                <a16:creationId xmlns:a16="http://schemas.microsoft.com/office/drawing/2014/main" id="{BF2BC2FF-C8A6-F94B-AB5A-6AD590A7F828}"/>
-              </a:ext>
-            </a:extLst>
-          </p:cNvPr>
-          <p:cNvSpPr txBox="1">
-            <a:spLocks/>
-          </p:cNvSpPr>
-          <p:nvPr/>
-        </p:nvSpPr>
-        <p:spPr>
-          <a:xfrm>
-            <a:off x="214148" y="3540306"/>
-            <a:ext cx="11549680" cy="2376441"/>
-          </a:xfrm>
-          <a:prstGeom prst="rect">
-            <a:avLst/>
-          </a:prstGeom>
-        </p:spPr>
-        <p:txBody>
-          <a:bodyPr vert="horz" lIns="91440" tIns="45720" rIns="91440" bIns="45720" rtlCol="0" anchor="ctr">
-            <a:normAutofit/>
-          </a:bodyPr>
-          <a:lstStyle>
-            <a:lvl1pPr marL="342900" indent="-342900" algn="l" defTabSz="914400" rtl="0" eaLnBrk="1" latinLnBrk="0" hangingPunct="1">
-              <a:lnSpc>
-                <a:spcPct val="90000"/>
-              </a:lnSpc>
-              <a:spcBef>
-                <a:spcPts val="1000"/>
-              </a:spcBef>
-              <a:buClr>
-                <a:srgbClr val="00B050"/>
-              </a:buClr>
-              <a:buFont typeface="Wingdings" panose="05000000000000000000" pitchFamily="2" charset="2"/>
-              <a:buChar char="Ø"/>
-              <a:defRPr sz="2400" kern="1200">
-                <a:solidFill>
-                  <a:schemeClr val="tx1"/>
-                </a:solidFill>
-                <a:latin typeface="Palatino Linotype" panose="02040502050505030304" pitchFamily="18" charset="0"/>
-                <a:ea typeface="+mn-ea"/>
-                <a:cs typeface="+mn-cs"/>
-              </a:defRPr>
-            </a:lvl1pPr>
-            <a:lvl2pPr marL="685800" indent="-228600" algn="l" defTabSz="914400" rtl="0" eaLnBrk="1" latinLnBrk="0" hangingPunct="1">
-              <a:lnSpc>
-                <a:spcPct val="90000"/>
-              </a:lnSpc>
-              <a:spcBef>
-                <a:spcPts val="500"/>
-              </a:spcBef>
-              <a:buClr>
-                <a:srgbClr val="00B050"/>
-              </a:buClr>
-              <a:buFont typeface="Wingdings" panose="05000000000000000000" pitchFamily="2" charset="2"/>
-              <a:buChar char="§"/>
-              <a:defRPr sz="2000" kern="1200">
-                <a:solidFill>
-                  <a:schemeClr val="tx1"/>
-                </a:solidFill>
-                <a:latin typeface="Palatino Linotype" panose="02040502050505030304" pitchFamily="18" charset="0"/>
-                <a:ea typeface="+mn-ea"/>
-                <a:cs typeface="+mn-cs"/>
-              </a:defRPr>
-            </a:lvl2pPr>
-            <a:lvl3pPr marL="1143000" indent="-228600" algn="l" defTabSz="914400" rtl="0" eaLnBrk="1" latinLnBrk="0" hangingPunct="1">
-              <a:lnSpc>
-                <a:spcPct val="90000"/>
-              </a:lnSpc>
-              <a:spcBef>
-                <a:spcPts val="500"/>
-              </a:spcBef>
-              <a:buClr>
-                <a:srgbClr val="00B050"/>
-              </a:buClr>
-              <a:buFont typeface="Arial" panose="020B0604020202020204" pitchFamily="34" charset="0"/>
-              <a:buChar char="•"/>
-              <a:defRPr sz="1800" kern="1200">
-                <a:solidFill>
-                  <a:schemeClr val="tx1"/>
-                </a:solidFill>
-                <a:latin typeface="Palatino Linotype" panose="02040502050505030304" pitchFamily="18" charset="0"/>
-                <a:ea typeface="+mn-ea"/>
-                <a:cs typeface="+mn-cs"/>
-              </a:defRPr>
-            </a:lvl3pPr>
-            <a:lvl4pPr marL="1600200" indent="-228600" algn="l" defTabSz="914400" rtl="0" eaLnBrk="1" latinLnBrk="0" hangingPunct="1">
-              <a:lnSpc>
-                <a:spcPct val="90000"/>
-              </a:lnSpc>
-              <a:spcBef>
-                <a:spcPts val="500"/>
-              </a:spcBef>
-              <a:buClr>
-                <a:srgbClr val="00B050"/>
-              </a:buClr>
-              <a:buFont typeface="Courier New" panose="02070309020205020404" pitchFamily="49" charset="0"/>
-              <a:buChar char="o"/>
-              <a:defRPr sz="1600" kern="1200">
-                <a:solidFill>
-                  <a:schemeClr val="tx1"/>
-                </a:solidFill>
-                <a:latin typeface="Palatino Linotype" panose="02040502050505030304" pitchFamily="18" charset="0"/>
-                <a:ea typeface="+mn-ea"/>
-                <a:cs typeface="+mn-cs"/>
-              </a:defRPr>
-            </a:lvl4pPr>
-            <a:lvl5pPr marL="2057400" indent="-228600" algn="l" defTabSz="914400" rtl="0" eaLnBrk="1" latinLnBrk="0" hangingPunct="1">
-              <a:lnSpc>
-                <a:spcPct val="90000"/>
-              </a:lnSpc>
-              <a:spcBef>
-                <a:spcPts val="500"/>
-              </a:spcBef>
-              <a:buClr>
-                <a:srgbClr val="00B050"/>
-              </a:buClr>
-              <a:buFont typeface="Times New Roman" panose="02020603050405020304" pitchFamily="18" charset="0"/>
-              <a:buChar char="̶"/>
-              <a:defRPr sz="1600" kern="1200">
-                <a:solidFill>
-                  <a:schemeClr val="tx1"/>
-                </a:solidFill>
-                <a:latin typeface="Palatino Linotype" panose="02040502050505030304" pitchFamily="18" charset="0"/>
-                <a:ea typeface="+mn-ea"/>
-                <a:cs typeface="+mn-cs"/>
-              </a:defRPr>
-            </a:lvl5pPr>
-            <a:lvl6pPr marL="2514600" indent="-228600" algn="l" defTabSz="914400" rtl="0" eaLnBrk="1" latinLnBrk="0" hangingPunct="1">
-              <a:lnSpc>
-                <a:spcPct val="90000"/>
-              </a:lnSpc>
-              <a:spcBef>
-                <a:spcPts val="500"/>
-              </a:spcBef>
-              <a:buFont typeface="Arial" panose="020B0604020202020204" pitchFamily="34" charset="0"/>
-              <a:buChar char="•"/>
-              <a:defRPr sz="1800" kern="1200">
-                <a:solidFill>
-                  <a:schemeClr val="tx1"/>
-                </a:solidFill>
-                <a:latin typeface="+mn-lt"/>
-                <a:ea typeface="+mn-ea"/>
-                <a:cs typeface="+mn-cs"/>
-              </a:defRPr>
-            </a:lvl6pPr>
-            <a:lvl7pPr marL="2971800" indent="-228600" algn="l" defTabSz="914400" rtl="0" eaLnBrk="1" latinLnBrk="0" hangingPunct="1">
-              <a:lnSpc>
-                <a:spcPct val="90000"/>
-              </a:lnSpc>
-              <a:spcBef>
-                <a:spcPts val="500"/>
-              </a:spcBef>
-              <a:buFont typeface="Arial" panose="020B0604020202020204" pitchFamily="34" charset="0"/>
-              <a:buChar char="•"/>
-              <a:defRPr sz="1800" kern="1200">
-                <a:solidFill>
-                  <a:schemeClr val="tx1"/>
-                </a:solidFill>
-                <a:latin typeface="+mn-lt"/>
-                <a:ea typeface="+mn-ea"/>
-                <a:cs typeface="+mn-cs"/>
-              </a:defRPr>
-            </a:lvl7pPr>
-            <a:lvl8pPr marL="3429000" indent="-228600" algn="l" defTabSz="914400" rtl="0" eaLnBrk="1" latinLnBrk="0" hangingPunct="1">
-              <a:lnSpc>
-                <a:spcPct val="90000"/>
-              </a:lnSpc>
-              <a:spcBef>
-                <a:spcPts val="500"/>
-              </a:spcBef>
-              <a:buFont typeface="Arial" panose="020B0604020202020204" pitchFamily="34" charset="0"/>
-              <a:buChar char="•"/>
-              <a:defRPr sz="1800" kern="1200">
-                <a:solidFill>
-                  <a:schemeClr val="tx1"/>
-                </a:solidFill>
-                <a:latin typeface="+mn-lt"/>
-                <a:ea typeface="+mn-ea"/>
-                <a:cs typeface="+mn-cs"/>
-              </a:defRPr>
-            </a:lvl8pPr>
-            <a:lvl9pPr marL="3886200" indent="-228600" algn="l" defTabSz="914400" rtl="0" eaLnBrk="1" latinLnBrk="0" hangingPunct="1">
-              <a:lnSpc>
-                <a:spcPct val="90000"/>
-              </a:lnSpc>
-              <a:spcBef>
-                <a:spcPts val="500"/>
-              </a:spcBef>
-              <a:buFont typeface="Arial" panose="020B0604020202020204" pitchFamily="34" charset="0"/>
-              <a:buChar char="•"/>
-              <a:defRPr sz="1800" kern="1200">
-                <a:solidFill>
-                  <a:schemeClr val="tx1"/>
-                </a:solidFill>
-                <a:latin typeface="+mn-lt"/>
-                <a:ea typeface="+mn-ea"/>
-                <a:cs typeface="+mn-cs"/>
-              </a:defRPr>
-            </a:lvl9pPr>
-          </a:lstStyle>
-          <a:p>
-            <a:pPr marL="0" indent="0" algn="ctr">
-              <a:buNone/>
-            </a:pPr>
-            <a:r>
-              <a:rPr lang="en-US" b="1" dirty="0"/>
-              <a:t>&lt;METHOD&gt; &lt;HTTP or HTTPS&gt;://&lt;DOMAIN&gt;/&lt;ENDPOINT&gt;?&lt;PARAMETERS&gt; </a:t>
-            </a:r>
-          </a:p>
-          <a:p>
-            <a:pPr marL="0" indent="0" algn="ctr">
-              <a:buNone/>
-            </a:pPr>
-            <a:r>
-              <a:rPr lang="en-US" b="1" dirty="0"/>
-              <a:t>+ </a:t>
-            </a:r>
-          </a:p>
-          <a:p>
-            <a:pPr marL="0" indent="0" algn="ctr">
-              <a:buNone/>
-            </a:pPr>
-            <a:r>
-              <a:rPr lang="en-US" b="1" dirty="0"/>
-              <a:t>&lt;BODY&gt; and &lt;HEADERS&gt;</a:t>
-            </a:r>
-          </a:p>
-        </p:txBody>
-      </p:sp>
-      <p:sp>
-        <p:nvSpPr>
           <p:cNvPr id="28" name="Content Placeholder 2">
             <a:extLst>
               <a:ext uri="{FF2B5EF4-FFF2-40B4-BE49-F238E27FC236}">
@@ -4143,7 +3823,7 @@
         <p:spPr>
           <a:xfrm>
             <a:off x="428172" y="1288595"/>
-            <a:ext cx="11213368" cy="2761253"/>
+            <a:ext cx="11213368" cy="4883605"/>
           </a:xfrm>
         </p:spPr>
         <p:txBody>
@@ -4154,28 +3834,53 @@
           <a:p>
             <a:r>
               <a:rPr lang="en-GB" dirty="0"/>
-              <a:t>From the practical point of view, RESTful API can be used via http/https following three steps:</a:t>
-            </a:r>
+              <a:t>Beside its content a response contains an </a:t>
+            </a:r>
+            <a:r>
+              <a:rPr lang="en-GB" b="1" dirty="0"/>
+              <a:t>HTTP status code</a:t>
+            </a:r>
+            <a:r>
+              <a:rPr lang="en-GB" dirty="0"/>
+              <a:t>, i.e., a special number that tells to the frond-end if the request is successful or, otherwise, why it is not successful. Here’s the most common:</a:t>
+            </a:r>
+          </a:p>
+          <a:p>
+            <a:endParaRPr lang="en-GB" dirty="0"/>
           </a:p>
           <a:p>
             <a:pPr lvl="1"/>
             <a:r>
               <a:rPr lang="en-GB" dirty="0"/>
-              <a:t>Step 1: Send an http/https request to the RESTful API</a:t>
+              <a:t>200: OK</a:t>
             </a:r>
           </a:p>
           <a:p>
             <a:pPr lvl="1"/>
             <a:r>
               <a:rPr lang="en-GB" dirty="0"/>
-              <a:t>Step 2: Await for the response</a:t>
+              <a:t>401: UNAUTHORIZED</a:t>
             </a:r>
           </a:p>
           <a:p>
             <a:pPr lvl="1"/>
             <a:r>
               <a:rPr lang="en-GB" dirty="0"/>
-              <a:t>Step 3: Process the response (usually in a JSON format)</a:t>
+              <a:t>403: FORBIDDEN</a:t>
+            </a:r>
+          </a:p>
+          <a:p>
+            <a:pPr lvl="1"/>
+            <a:r>
+              <a:rPr lang="en-GB" dirty="0"/>
+              <a:t>404: NOT FOUND</a:t>
+            </a:r>
+          </a:p>
+          <a:p>
+            <a:pPr lvl="1"/>
+            <a:r>
+              <a:rPr lang="en-GB" dirty="0"/>
+              <a:t>500: INTERNAL SERVER ERROR</a:t>
             </a:r>
           </a:p>
           <a:p>
@@ -4185,243 +3890,7 @@
           <a:p>
             <a:r>
               <a:rPr lang="en-GB" dirty="0"/>
-              <a:t>The http/https request has the following structure:</a:t>
-            </a:r>
-          </a:p>
-        </p:txBody>
-      </p:sp>
-      <p:sp>
-        <p:nvSpPr>
-          <p:cNvPr id="30" name="Content Placeholder 2">
-            <a:extLst>
-              <a:ext uri="{FF2B5EF4-FFF2-40B4-BE49-F238E27FC236}">
-                <a16:creationId xmlns:a16="http://schemas.microsoft.com/office/drawing/2014/main" id="{1201FA3F-A09A-234D-AEF1-050D16E6F018}"/>
-              </a:ext>
-            </a:extLst>
-          </p:cNvPr>
-          <p:cNvSpPr txBox="1">
-            <a:spLocks/>
-          </p:cNvSpPr>
-          <p:nvPr/>
-        </p:nvSpPr>
-        <p:spPr>
-          <a:xfrm>
-            <a:off x="428172" y="5610404"/>
-            <a:ext cx="11817168" cy="1085670"/>
-          </a:xfrm>
-          <a:prstGeom prst="rect">
-            <a:avLst/>
-          </a:prstGeom>
-        </p:spPr>
-        <p:txBody>
-          <a:bodyPr vert="horz" lIns="91440" tIns="45720" rIns="91440" bIns="45720" rtlCol="0">
-            <a:normAutofit fontScale="92500" lnSpcReduction="20000"/>
-          </a:bodyPr>
-          <a:lstStyle>
-            <a:lvl1pPr marL="342900" indent="-342900" algn="l" defTabSz="914400" rtl="0" eaLnBrk="1" latinLnBrk="0" hangingPunct="1">
-              <a:lnSpc>
-                <a:spcPct val="90000"/>
-              </a:lnSpc>
-              <a:spcBef>
-                <a:spcPts val="1000"/>
-              </a:spcBef>
-              <a:buClr>
-                <a:srgbClr val="00B050"/>
-              </a:buClr>
-              <a:buFont typeface="Wingdings" panose="05000000000000000000" pitchFamily="2" charset="2"/>
-              <a:buChar char="Ø"/>
-              <a:defRPr sz="2400" kern="1200">
-                <a:solidFill>
-                  <a:schemeClr val="tx1"/>
-                </a:solidFill>
-                <a:latin typeface="Palatino Linotype" panose="02040502050505030304" pitchFamily="18" charset="0"/>
-                <a:ea typeface="+mn-ea"/>
-                <a:cs typeface="+mn-cs"/>
-              </a:defRPr>
-            </a:lvl1pPr>
-            <a:lvl2pPr marL="685800" indent="-228600" algn="l" defTabSz="914400" rtl="0" eaLnBrk="1" latinLnBrk="0" hangingPunct="1">
-              <a:lnSpc>
-                <a:spcPct val="90000"/>
-              </a:lnSpc>
-              <a:spcBef>
-                <a:spcPts val="500"/>
-              </a:spcBef>
-              <a:buClr>
-                <a:srgbClr val="00B050"/>
-              </a:buClr>
-              <a:buFont typeface="Wingdings" panose="05000000000000000000" pitchFamily="2" charset="2"/>
-              <a:buChar char="§"/>
-              <a:defRPr sz="2000" kern="1200">
-                <a:solidFill>
-                  <a:schemeClr val="tx1"/>
-                </a:solidFill>
-                <a:latin typeface="Palatino Linotype" panose="02040502050505030304" pitchFamily="18" charset="0"/>
-                <a:ea typeface="+mn-ea"/>
-                <a:cs typeface="+mn-cs"/>
-              </a:defRPr>
-            </a:lvl2pPr>
-            <a:lvl3pPr marL="1143000" indent="-228600" algn="l" defTabSz="914400" rtl="0" eaLnBrk="1" latinLnBrk="0" hangingPunct="1">
-              <a:lnSpc>
-                <a:spcPct val="90000"/>
-              </a:lnSpc>
-              <a:spcBef>
-                <a:spcPts val="500"/>
-              </a:spcBef>
-              <a:buClr>
-                <a:srgbClr val="00B050"/>
-              </a:buClr>
-              <a:buFont typeface="Arial" panose="020B0604020202020204" pitchFamily="34" charset="0"/>
-              <a:buChar char="•"/>
-              <a:defRPr sz="1800" kern="1200">
-                <a:solidFill>
-                  <a:schemeClr val="tx1"/>
-                </a:solidFill>
-                <a:latin typeface="Palatino Linotype" panose="02040502050505030304" pitchFamily="18" charset="0"/>
-                <a:ea typeface="+mn-ea"/>
-                <a:cs typeface="+mn-cs"/>
-              </a:defRPr>
-            </a:lvl3pPr>
-            <a:lvl4pPr marL="1600200" indent="-228600" algn="l" defTabSz="914400" rtl="0" eaLnBrk="1" latinLnBrk="0" hangingPunct="1">
-              <a:lnSpc>
-                <a:spcPct val="90000"/>
-              </a:lnSpc>
-              <a:spcBef>
-                <a:spcPts val="500"/>
-              </a:spcBef>
-              <a:buClr>
-                <a:srgbClr val="00B050"/>
-              </a:buClr>
-              <a:buFont typeface="Courier New" panose="02070309020205020404" pitchFamily="49" charset="0"/>
-              <a:buChar char="o"/>
-              <a:defRPr sz="1600" kern="1200">
-                <a:solidFill>
-                  <a:schemeClr val="tx1"/>
-                </a:solidFill>
-                <a:latin typeface="Palatino Linotype" panose="02040502050505030304" pitchFamily="18" charset="0"/>
-                <a:ea typeface="+mn-ea"/>
-                <a:cs typeface="+mn-cs"/>
-              </a:defRPr>
-            </a:lvl4pPr>
-            <a:lvl5pPr marL="2057400" indent="-228600" algn="l" defTabSz="914400" rtl="0" eaLnBrk="1" latinLnBrk="0" hangingPunct="1">
-              <a:lnSpc>
-                <a:spcPct val="90000"/>
-              </a:lnSpc>
-              <a:spcBef>
-                <a:spcPts val="500"/>
-              </a:spcBef>
-              <a:buClr>
-                <a:srgbClr val="00B050"/>
-              </a:buClr>
-              <a:buFont typeface="Times New Roman" panose="02020603050405020304" pitchFamily="18" charset="0"/>
-              <a:buChar char="̶"/>
-              <a:defRPr sz="1600" kern="1200">
-                <a:solidFill>
-                  <a:schemeClr val="tx1"/>
-                </a:solidFill>
-                <a:latin typeface="Palatino Linotype" panose="02040502050505030304" pitchFamily="18" charset="0"/>
-                <a:ea typeface="+mn-ea"/>
-                <a:cs typeface="+mn-cs"/>
-              </a:defRPr>
-            </a:lvl5pPr>
-            <a:lvl6pPr marL="2514600" indent="-228600" algn="l" defTabSz="914400" rtl="0" eaLnBrk="1" latinLnBrk="0" hangingPunct="1">
-              <a:lnSpc>
-                <a:spcPct val="90000"/>
-              </a:lnSpc>
-              <a:spcBef>
-                <a:spcPts val="500"/>
-              </a:spcBef>
-              <a:buFont typeface="Arial" panose="020B0604020202020204" pitchFamily="34" charset="0"/>
-              <a:buChar char="•"/>
-              <a:defRPr sz="1800" kern="1200">
-                <a:solidFill>
-                  <a:schemeClr val="tx1"/>
-                </a:solidFill>
-                <a:latin typeface="+mn-lt"/>
-                <a:ea typeface="+mn-ea"/>
-                <a:cs typeface="+mn-cs"/>
-              </a:defRPr>
-            </a:lvl6pPr>
-            <a:lvl7pPr marL="2971800" indent="-228600" algn="l" defTabSz="914400" rtl="0" eaLnBrk="1" latinLnBrk="0" hangingPunct="1">
-              <a:lnSpc>
-                <a:spcPct val="90000"/>
-              </a:lnSpc>
-              <a:spcBef>
-                <a:spcPts val="500"/>
-              </a:spcBef>
-              <a:buFont typeface="Arial" panose="020B0604020202020204" pitchFamily="34" charset="0"/>
-              <a:buChar char="•"/>
-              <a:defRPr sz="1800" kern="1200">
-                <a:solidFill>
-                  <a:schemeClr val="tx1"/>
-                </a:solidFill>
-                <a:latin typeface="+mn-lt"/>
-                <a:ea typeface="+mn-ea"/>
-                <a:cs typeface="+mn-cs"/>
-              </a:defRPr>
-            </a:lvl7pPr>
-            <a:lvl8pPr marL="3429000" indent="-228600" algn="l" defTabSz="914400" rtl="0" eaLnBrk="1" latinLnBrk="0" hangingPunct="1">
-              <a:lnSpc>
-                <a:spcPct val="90000"/>
-              </a:lnSpc>
-              <a:spcBef>
-                <a:spcPts val="500"/>
-              </a:spcBef>
-              <a:buFont typeface="Arial" panose="020B0604020202020204" pitchFamily="34" charset="0"/>
-              <a:buChar char="•"/>
-              <a:defRPr sz="1800" kern="1200">
-                <a:solidFill>
-                  <a:schemeClr val="tx1"/>
-                </a:solidFill>
-                <a:latin typeface="+mn-lt"/>
-                <a:ea typeface="+mn-ea"/>
-                <a:cs typeface="+mn-cs"/>
-              </a:defRPr>
-            </a:lvl8pPr>
-            <a:lvl9pPr marL="3886200" indent="-228600" algn="l" defTabSz="914400" rtl="0" eaLnBrk="1" latinLnBrk="0" hangingPunct="1">
-              <a:lnSpc>
-                <a:spcPct val="90000"/>
-              </a:lnSpc>
-              <a:spcBef>
-                <a:spcPts val="500"/>
-              </a:spcBef>
-              <a:buFont typeface="Arial" panose="020B0604020202020204" pitchFamily="34" charset="0"/>
-              <a:buChar char="•"/>
-              <a:defRPr sz="1800" kern="1200">
-                <a:solidFill>
-                  <a:schemeClr val="tx1"/>
-                </a:solidFill>
-                <a:latin typeface="+mn-lt"/>
-                <a:ea typeface="+mn-ea"/>
-                <a:cs typeface="+mn-cs"/>
-              </a:defRPr>
-            </a:lvl9pPr>
-          </a:lstStyle>
-          <a:p>
-            <a:r>
-              <a:rPr lang="en-GB" dirty="0"/>
-              <a:t>&lt;METHOD&gt; and &lt;ENDPOINT&gt; defines the so-called </a:t>
-            </a:r>
-            <a:r>
-              <a:rPr lang="en-GB" b="1" dirty="0"/>
-              <a:t>route, e.g.:</a:t>
-            </a:r>
-          </a:p>
-          <a:p>
-            <a:pPr marL="0" indent="0">
-              <a:buNone/>
-            </a:pPr>
-            <a:r>
-              <a:rPr lang="en-GB" b="1" dirty="0"/>
-              <a:t>	GET /heartrate/today/</a:t>
-            </a:r>
-          </a:p>
-          <a:p>
-            <a:pPr marL="0" indent="0">
-              <a:buNone/>
-            </a:pPr>
-            <a:r>
-              <a:rPr lang="en-GB" b="1" dirty="0"/>
-              <a:t>	DELETE /user/1</a:t>
+              <a:t>Normally, the front-end developer has to manage these codes based on the API specifics</a:t>
             </a:r>
           </a:p>
         </p:txBody>
@@ -4429,7 +3898,7 @@
     </p:spTree>
     <p:extLst>
       <p:ext uri="{BB962C8B-B14F-4D97-AF65-F5344CB8AC3E}">
-        <p14:creationId xmlns:p14="http://schemas.microsoft.com/office/powerpoint/2010/main" val="2468140370"/>
+        <p14:creationId xmlns:p14="http://schemas.microsoft.com/office/powerpoint/2010/main" val="518817181"/>
       </p:ext>
     </p:extLst>
   </p:cSld>
@@ -4479,155 +3948,6 @@
           <a:p>
             <a:r>
               <a:rPr lang="en-IT" dirty="0"/>
-              <a:t>RESTful API in practice</a:t>
-            </a:r>
-          </a:p>
-        </p:txBody>
-      </p:sp>
-      <p:sp>
-        <p:nvSpPr>
-          <p:cNvPr id="28" name="Content Placeholder 2">
-            <a:extLst>
-              <a:ext uri="{FF2B5EF4-FFF2-40B4-BE49-F238E27FC236}">
-                <a16:creationId xmlns:a16="http://schemas.microsoft.com/office/drawing/2014/main" id="{4093C35F-2A4D-4648-A78F-D26C9363BF9B}"/>
-              </a:ext>
-            </a:extLst>
-          </p:cNvPr>
-          <p:cNvSpPr>
-            <a:spLocks noGrp="1"/>
-          </p:cNvSpPr>
-          <p:nvPr>
-            <p:ph idx="1"/>
-          </p:nvPr>
-        </p:nvSpPr>
-        <p:spPr>
-          <a:xfrm>
-            <a:off x="428172" y="1288595"/>
-            <a:ext cx="11213368" cy="4883605"/>
-          </a:xfrm>
-        </p:spPr>
-        <p:txBody>
-          <a:bodyPr>
-            <a:normAutofit/>
-          </a:bodyPr>
-          <a:lstStyle/>
-          <a:p>
-            <a:r>
-              <a:rPr lang="en-GB" dirty="0"/>
-              <a:t>Beside its content a response contains an </a:t>
-            </a:r>
-            <a:r>
-              <a:rPr lang="en-GB" b="1" dirty="0"/>
-              <a:t>HTTP status code</a:t>
-            </a:r>
-            <a:r>
-              <a:rPr lang="en-GB" dirty="0"/>
-              <a:t>, i.e., a special number that tells to the frond-end if the request is successful or, otherwise, why it is not successful. Here’s the most common:</a:t>
-            </a:r>
-          </a:p>
-          <a:p>
-            <a:endParaRPr lang="en-GB" dirty="0"/>
-          </a:p>
-          <a:p>
-            <a:pPr lvl="1"/>
-            <a:r>
-              <a:rPr lang="en-GB" dirty="0"/>
-              <a:t>200: OK</a:t>
-            </a:r>
-          </a:p>
-          <a:p>
-            <a:pPr lvl="1"/>
-            <a:r>
-              <a:rPr lang="en-GB" dirty="0"/>
-              <a:t>401: UNAUTHORIZED</a:t>
-            </a:r>
-          </a:p>
-          <a:p>
-            <a:pPr lvl="1"/>
-            <a:r>
-              <a:rPr lang="en-GB" dirty="0"/>
-              <a:t>403: FORBIDDEN</a:t>
-            </a:r>
-          </a:p>
-          <a:p>
-            <a:pPr lvl="1"/>
-            <a:r>
-              <a:rPr lang="en-GB" dirty="0"/>
-              <a:t>404: NOT FOUND</a:t>
-            </a:r>
-          </a:p>
-          <a:p>
-            <a:pPr lvl="1"/>
-            <a:r>
-              <a:rPr lang="en-GB" dirty="0"/>
-              <a:t>500: INTERNAL SERVER ERROR</a:t>
-            </a:r>
-          </a:p>
-          <a:p>
-            <a:pPr lvl="1"/>
-            <a:endParaRPr lang="en-GB" dirty="0"/>
-          </a:p>
-          <a:p>
-            <a:r>
-              <a:rPr lang="en-GB" dirty="0"/>
-              <a:t>Normally, the front-end developer has to manage these codes based on the API specifics</a:t>
-            </a:r>
-          </a:p>
-        </p:txBody>
-      </p:sp>
-    </p:spTree>
-    <p:extLst>
-      <p:ext uri="{BB962C8B-B14F-4D97-AF65-F5344CB8AC3E}">
-        <p14:creationId xmlns:p14="http://schemas.microsoft.com/office/powerpoint/2010/main" val="518817181"/>
-      </p:ext>
-    </p:extLst>
-  </p:cSld>
-  <p:clrMapOvr>
-    <a:masterClrMapping/>
-  </p:clrMapOvr>
-</p:sld>
-</file>
-
-<file path=ppt/slides/slide12.xml><?xml version="1.0" encoding="utf-8"?>
-<p:sld xmlns:a="http://schemas.openxmlformats.org/drawingml/2006/main" xmlns:r="http://schemas.openxmlformats.org/officeDocument/2006/relationships" xmlns:p="http://schemas.openxmlformats.org/presentationml/2006/main">
-  <p:cSld>
-    <p:spTree>
-      <p:nvGrpSpPr>
-        <p:cNvPr id="1" name=""/>
-        <p:cNvGrpSpPr/>
-        <p:nvPr/>
-      </p:nvGrpSpPr>
-      <p:grpSpPr>
-        <a:xfrm>
-          <a:off x="0" y="0"/>
-          <a:ext cx="0" cy="0"/>
-          <a:chOff x="0" y="0"/>
-          <a:chExt cx="0" cy="0"/>
-        </a:xfrm>
-      </p:grpSpPr>
-      <p:sp>
-        <p:nvSpPr>
-          <p:cNvPr id="2" name="Title 1">
-            <a:extLst>
-              <a:ext uri="{FF2B5EF4-FFF2-40B4-BE49-F238E27FC236}">
-                <a16:creationId xmlns:a16="http://schemas.microsoft.com/office/drawing/2014/main" id="{122C1E14-0610-FB4E-BCD3-3BA8CADF9D02}"/>
-              </a:ext>
-            </a:extLst>
-          </p:cNvPr>
-          <p:cNvSpPr>
-            <a:spLocks noGrp="1"/>
-          </p:cNvSpPr>
-          <p:nvPr>
-            <p:ph type="title"/>
-          </p:nvPr>
-        </p:nvSpPr>
-        <p:spPr/>
-        <p:txBody>
-          <a:bodyPr/>
-          <a:lstStyle/>
-          <a:p>
-            <a:r>
-              <a:rPr lang="en-IT" dirty="0"/>
               <a:t>Outline</a:t>
             </a:r>
           </a:p>
@@ -4765,7 +4085,7 @@
 </p:sld>
 </file>
 
-<file path=ppt/slides/slide13.xml><?xml version="1.0" encoding="utf-8"?>
+<file path=ppt/slides/slide12.xml><?xml version="1.0" encoding="utf-8"?>
 <p:sld xmlns:a="http://schemas.openxmlformats.org/drawingml/2006/main" xmlns:r="http://schemas.openxmlformats.org/officeDocument/2006/relationships" xmlns:p="http://schemas.openxmlformats.org/presentationml/2006/main">
   <p:cSld>
     <p:spTree>
@@ -4895,7 +4215,7 @@
 </p:sld>
 </file>
 
-<file path=ppt/slides/slide14.xml><?xml version="1.0" encoding="utf-8"?>
+<file path=ppt/slides/slide13.xml><?xml version="1.0" encoding="utf-8"?>
 <p:sld xmlns:a="http://schemas.openxmlformats.org/drawingml/2006/main" xmlns:r="http://schemas.openxmlformats.org/officeDocument/2006/relationships" xmlns:p="http://schemas.openxmlformats.org/presentationml/2006/main">
   <p:cSld>
     <p:spTree>
@@ -4989,7 +4309,7 @@
 </p:sld>
 </file>
 
-<file path=ppt/slides/slide15.xml><?xml version="1.0" encoding="utf-8"?>
+<file path=ppt/slides/slide14.xml><?xml version="1.0" encoding="utf-8"?>
 <p:sld xmlns:a="http://schemas.openxmlformats.org/drawingml/2006/main" xmlns:r="http://schemas.openxmlformats.org/officeDocument/2006/relationships" xmlns:p="http://schemas.openxmlformats.org/presentationml/2006/main">
   <p:cSld>
     <p:spTree>
@@ -5083,7 +4403,7 @@
 </p:sld>
 </file>
 
-<file path=ppt/slides/slide16.xml><?xml version="1.0" encoding="utf-8"?>
+<file path=ppt/slides/slide15.xml><?xml version="1.0" encoding="utf-8"?>
 <p:sld xmlns:a="http://schemas.openxmlformats.org/drawingml/2006/main" xmlns:r="http://schemas.openxmlformats.org/officeDocument/2006/relationships" xmlns:p="http://schemas.openxmlformats.org/presentationml/2006/main">
   <p:cSld>
     <p:spTree>
@@ -5177,7 +4497,7 @@
 </p:sld>
 </file>
 
-<file path=ppt/slides/slide17.xml><?xml version="1.0" encoding="utf-8"?>
+<file path=ppt/slides/slide16.xml><?xml version="1.0" encoding="utf-8"?>
 <p:sld xmlns:a="http://schemas.openxmlformats.org/drawingml/2006/main" xmlns:r="http://schemas.openxmlformats.org/officeDocument/2006/relationships" xmlns:p="http://schemas.openxmlformats.org/presentationml/2006/main">
   <p:cSld>
     <p:spTree>
@@ -5259,10 +4579,10 @@
       </p:sp>
       <p:pic>
         <p:nvPicPr>
-          <p:cNvPr id="5" name="Picture 4" descr="A screenshot of a computer&#10;&#10;Description automatically generated with medium confidence">
+          <p:cNvPr id="4" name="Picture 3" descr="A screenshot of a computer program&#10;&#10;Description automatically generated">
             <a:extLst>
               <a:ext uri="{FF2B5EF4-FFF2-40B4-BE49-F238E27FC236}">
-                <a16:creationId xmlns:a16="http://schemas.microsoft.com/office/drawing/2014/main" id="{1D863827-79EA-EB7F-BC13-D269C7EE2FDD}"/>
+                <a16:creationId xmlns:a16="http://schemas.microsoft.com/office/drawing/2014/main" id="{9BF8BFAE-FC49-AC15-A39D-31649340E97C}"/>
               </a:ext>
             </a:extLst>
           </p:cNvPr>
@@ -5285,8 +4605,8 @@
         </p:blipFill>
         <p:spPr>
           <a:xfrm>
-            <a:off x="1859280" y="2239688"/>
-            <a:ext cx="7772400" cy="4432502"/>
+            <a:off x="3438155" y="2155192"/>
+            <a:ext cx="5315690" cy="4540882"/>
           </a:xfrm>
           <a:prstGeom prst="rect">
             <a:avLst/>
@@ -5306,7 +4626,7 @@
 </p:sld>
 </file>
 
-<file path=ppt/slides/slide18.xml><?xml version="1.0" encoding="utf-8"?>
+<file path=ppt/slides/slide17.xml><?xml version="1.0" encoding="utf-8"?>
 <p:sld xmlns:a="http://schemas.openxmlformats.org/drawingml/2006/main" xmlns:r="http://schemas.openxmlformats.org/officeDocument/2006/relationships" xmlns:p="http://schemas.openxmlformats.org/presentationml/2006/main">
   <p:cSld>
     <p:spTree>
@@ -5558,7 +4878,7 @@
 </p:sld>
 </file>
 
-<file path=ppt/slides/slide19.xml><?xml version="1.0" encoding="utf-8"?>
+<file path=ppt/slides/slide18.xml><?xml version="1.0" encoding="utf-8"?>
 <p:sld xmlns:a="http://schemas.openxmlformats.org/drawingml/2006/main" xmlns:r="http://schemas.openxmlformats.org/officeDocument/2006/relationships" xmlns:p="http://schemas.openxmlformats.org/presentationml/2006/main">
   <p:cSld>
     <p:spTree>
@@ -6084,42 +5404,6 @@
           </a:p>
         </p:txBody>
       </p:sp>
-      <p:pic>
-        <p:nvPicPr>
-          <p:cNvPr id="6" name="Picture 5" descr="A picture containing text, screenshot, design&#10;&#10;Description automatically generated">
-            <a:extLst>
-              <a:ext uri="{FF2B5EF4-FFF2-40B4-BE49-F238E27FC236}">
-                <a16:creationId xmlns:a16="http://schemas.microsoft.com/office/drawing/2014/main" id="{3D22180C-148A-C86F-A155-687ED139E052}"/>
-              </a:ext>
-            </a:extLst>
-          </p:cNvPr>
-          <p:cNvPicPr>
-            <a:picLocks noChangeAspect="1"/>
-          </p:cNvPicPr>
-          <p:nvPr/>
-        </p:nvPicPr>
-        <p:blipFill>
-          <a:blip r:embed="rId3">
-            <a:extLst>
-              <a:ext uri="{28A0092B-C50C-407E-A947-70E740481C1C}">
-                <a14:useLocalDpi xmlns:a14="http://schemas.microsoft.com/office/drawing/2010/main" val="0"/>
-              </a:ext>
-            </a:extLst>
-          </a:blip>
-          <a:stretch>
-            <a:fillRect/>
-          </a:stretch>
-        </p:blipFill>
-        <p:spPr>
-          <a:xfrm>
-            <a:off x="8884258" y="742211"/>
-            <a:ext cx="2604688" cy="5637199"/>
-          </a:xfrm>
-          <a:prstGeom prst="rect">
-            <a:avLst/>
-          </a:prstGeom>
-        </p:spPr>
-      </p:pic>
       <p:sp>
         <p:nvSpPr>
           <p:cNvPr id="13" name="Rectangle 12">
@@ -6356,10 +5640,223 @@
           </a:fontRef>
         </p:style>
       </p:cxnSp>
+      <p:pic>
+        <p:nvPicPr>
+          <p:cNvPr id="7" name="Picture 6" descr="A screenshot of a phone&#10;&#10;Description automatically generated">
+            <a:extLst>
+              <a:ext uri="{FF2B5EF4-FFF2-40B4-BE49-F238E27FC236}">
+                <a16:creationId xmlns:a16="http://schemas.microsoft.com/office/drawing/2014/main" id="{E402003B-CBF9-2318-EFB8-3FFAC7E3A7A5}"/>
+              </a:ext>
+            </a:extLst>
+          </p:cNvPr>
+          <p:cNvPicPr>
+            <a:picLocks noChangeAspect="1"/>
+          </p:cNvPicPr>
+          <p:nvPr/>
+        </p:nvPicPr>
+        <p:blipFill>
+          <a:blip r:embed="rId3">
+            <a:extLst>
+              <a:ext uri="{28A0092B-C50C-407E-A947-70E740481C1C}">
+                <a14:useLocalDpi xmlns:a14="http://schemas.microsoft.com/office/drawing/2010/main" val="0"/>
+              </a:ext>
+            </a:extLst>
+          </a:blip>
+          <a:stretch>
+            <a:fillRect/>
+          </a:stretch>
+        </p:blipFill>
+        <p:spPr>
+          <a:xfrm>
+            <a:off x="8917350" y="680583"/>
+            <a:ext cx="2536093" cy="5496833"/>
+          </a:xfrm>
+          <a:prstGeom prst="rect">
+            <a:avLst/>
+          </a:prstGeom>
+        </p:spPr>
+      </p:pic>
     </p:spTree>
     <p:extLst>
       <p:ext uri="{BB962C8B-B14F-4D97-AF65-F5344CB8AC3E}">
         <p14:creationId xmlns:p14="http://schemas.microsoft.com/office/powerpoint/2010/main" val="1033640339"/>
+      </p:ext>
+    </p:extLst>
+  </p:cSld>
+  <p:clrMapOvr>
+    <a:masterClrMapping/>
+  </p:clrMapOvr>
+</p:sld>
+</file>
+
+<file path=ppt/slides/slide19.xml><?xml version="1.0" encoding="utf-8"?>
+<p:sld xmlns:a="http://schemas.openxmlformats.org/drawingml/2006/main" xmlns:r="http://schemas.openxmlformats.org/officeDocument/2006/relationships" xmlns:p="http://schemas.openxmlformats.org/presentationml/2006/main">
+  <p:cSld>
+    <p:spTree>
+      <p:nvGrpSpPr>
+        <p:cNvPr id="1" name=""/>
+        <p:cNvGrpSpPr/>
+        <p:nvPr/>
+      </p:nvGrpSpPr>
+      <p:grpSpPr>
+        <a:xfrm>
+          <a:off x="0" y="0"/>
+          <a:ext cx="0" cy="0"/>
+          <a:chOff x="0" y="0"/>
+          <a:chExt cx="0" cy="0"/>
+        </a:xfrm>
+      </p:grpSpPr>
+      <p:sp>
+        <p:nvSpPr>
+          <p:cNvPr id="2" name="Title 1">
+            <a:extLst>
+              <a:ext uri="{FF2B5EF4-FFF2-40B4-BE49-F238E27FC236}">
+                <a16:creationId xmlns:a16="http://schemas.microsoft.com/office/drawing/2014/main" id="{122C1E14-0610-FB4E-BCD3-3BA8CADF9D02}"/>
+              </a:ext>
+            </a:extLst>
+          </p:cNvPr>
+          <p:cNvSpPr>
+            <a:spLocks noGrp="1"/>
+          </p:cNvSpPr>
+          <p:nvPr>
+            <p:ph type="title"/>
+          </p:nvPr>
+        </p:nvSpPr>
+        <p:spPr/>
+        <p:txBody>
+          <a:bodyPr/>
+          <a:lstStyle/>
+          <a:p>
+            <a:r>
+              <a:rPr lang="en-IT" dirty="0"/>
+              <a:t>Outline</a:t>
+            </a:r>
+          </a:p>
+        </p:txBody>
+      </p:sp>
+      <p:sp>
+        <p:nvSpPr>
+          <p:cNvPr id="3" name="Content Placeholder 2">
+            <a:extLst>
+              <a:ext uri="{FF2B5EF4-FFF2-40B4-BE49-F238E27FC236}">
+                <a16:creationId xmlns:a16="http://schemas.microsoft.com/office/drawing/2014/main" id="{8962CCAC-9D70-C543-BBE0-822B6CB5F5CB}"/>
+              </a:ext>
+            </a:extLst>
+          </p:cNvPr>
+          <p:cNvSpPr>
+            <a:spLocks noGrp="1"/>
+          </p:cNvSpPr>
+          <p:nvPr>
+            <p:ph idx="1"/>
+          </p:nvPr>
+        </p:nvSpPr>
+        <p:spPr>
+          <a:xfrm>
+            <a:off x="428172" y="1361167"/>
+            <a:ext cx="11213368" cy="5334907"/>
+          </a:xfrm>
+        </p:spPr>
+        <p:txBody>
+          <a:bodyPr>
+            <a:normAutofit/>
+          </a:bodyPr>
+          <a:lstStyle/>
+          <a:p>
+            <a:r>
+              <a:rPr lang="en-GB" dirty="0">
+                <a:solidFill>
+                  <a:schemeClr val="bg2">
+                    <a:lumMod val="90000"/>
+                  </a:schemeClr>
+                </a:solidFill>
+              </a:rPr>
+              <a:t>Recap</a:t>
+            </a:r>
+          </a:p>
+          <a:p>
+            <a:r>
+              <a:rPr lang="en-GB" dirty="0">
+                <a:solidFill>
+                  <a:schemeClr val="bg2">
+                    <a:lumMod val="90000"/>
+                  </a:schemeClr>
+                </a:solidFill>
+              </a:rPr>
+              <a:t>The flow</a:t>
+            </a:r>
+          </a:p>
+          <a:p>
+            <a:r>
+              <a:rPr lang="en-GB" dirty="0">
+                <a:solidFill>
+                  <a:schemeClr val="bg2">
+                    <a:lumMod val="90000"/>
+                  </a:schemeClr>
+                </a:solidFill>
+              </a:rPr>
+              <a:t>RESTful API in practice</a:t>
+            </a:r>
+          </a:p>
+          <a:p>
+            <a:r>
+              <a:rPr lang="en-GB" dirty="0">
+                <a:solidFill>
+                  <a:schemeClr val="bg2">
+                    <a:lumMod val="90000"/>
+                  </a:schemeClr>
+                </a:solidFill>
+              </a:rPr>
+              <a:t>Case study</a:t>
+            </a:r>
+          </a:p>
+          <a:p>
+            <a:endParaRPr lang="en-GB" dirty="0">
+              <a:solidFill>
+                <a:schemeClr val="bg2">
+                  <a:lumMod val="90000"/>
+                </a:schemeClr>
+              </a:solidFill>
+            </a:endParaRPr>
+          </a:p>
+          <a:p>
+            <a:r>
+              <a:rPr lang="en-GB" b="1" dirty="0"/>
+              <a:t>Exercise</a:t>
+            </a:r>
+          </a:p>
+          <a:p>
+            <a:r>
+              <a:rPr lang="en-GB" dirty="0">
+                <a:solidFill>
+                  <a:schemeClr val="bg2">
+                    <a:lumMod val="90000"/>
+                  </a:schemeClr>
+                </a:solidFill>
+              </a:rPr>
+              <a:t>Homework</a:t>
+            </a:r>
+          </a:p>
+          <a:p>
+            <a:r>
+              <a:rPr lang="en-GB" dirty="0">
+                <a:solidFill>
+                  <a:schemeClr val="bg2">
+                    <a:lumMod val="90000"/>
+                  </a:schemeClr>
+                </a:solidFill>
+              </a:rPr>
+              <a:t>Resources</a:t>
+            </a:r>
+          </a:p>
+          <a:p>
+            <a:endParaRPr lang="en-GB" dirty="0"/>
+          </a:p>
+        </p:txBody>
+      </p:sp>
+    </p:spTree>
+    <p:extLst>
+      <p:ext uri="{BB962C8B-B14F-4D97-AF65-F5344CB8AC3E}">
+        <p14:creationId xmlns:p14="http://schemas.microsoft.com/office/powerpoint/2010/main" val="1809343629"/>
       </p:ext>
     </p:extLst>
   </p:cSld>
@@ -6586,7 +6083,7 @@
           <a:p>
             <a:r>
               <a:rPr lang="en-IT" dirty="0"/>
-              <a:t>Outline</a:t>
+              <a:t>Exercise </a:t>
             </a:r>
           </a:p>
         </p:txBody>
@@ -6619,101 +6116,246 @@
           </a:bodyPr>
           <a:lstStyle/>
           <a:p>
-            <a:r>
-              <a:rPr lang="en-GB" dirty="0">
-                <a:solidFill>
-                  <a:schemeClr val="bg2">
-                    <a:lumMod val="90000"/>
-                  </a:schemeClr>
-                </a:solidFill>
-              </a:rPr>
-              <a:t>Recap</a:t>
-            </a:r>
-          </a:p>
-          <a:p>
-            <a:r>
-              <a:rPr lang="en-GB" dirty="0">
-                <a:solidFill>
-                  <a:schemeClr val="bg2">
-                    <a:lumMod val="90000"/>
-                  </a:schemeClr>
-                </a:solidFill>
-              </a:rPr>
-              <a:t>The flow</a:t>
-            </a:r>
-          </a:p>
-          <a:p>
-            <a:r>
-              <a:rPr lang="en-GB" dirty="0">
-                <a:solidFill>
-                  <a:schemeClr val="bg2">
-                    <a:lumMod val="90000"/>
-                  </a:schemeClr>
-                </a:solidFill>
-              </a:rPr>
-              <a:t>RESTful API in practice</a:t>
-            </a:r>
-          </a:p>
-          <a:p>
-            <a:r>
-              <a:rPr lang="en-GB" dirty="0">
-                <a:solidFill>
-                  <a:schemeClr val="bg2">
-                    <a:lumMod val="90000"/>
-                  </a:schemeClr>
-                </a:solidFill>
-              </a:rPr>
-              <a:t>Case study</a:t>
-            </a:r>
-          </a:p>
-          <a:p>
-            <a:endParaRPr lang="en-GB" dirty="0">
-              <a:solidFill>
-                <a:schemeClr val="bg2">
-                  <a:lumMod val="90000"/>
-                </a:schemeClr>
-              </a:solidFill>
-            </a:endParaRPr>
-          </a:p>
-          <a:p>
-            <a:r>
-              <a:rPr lang="en-GB" b="1" dirty="0"/>
-              <a:t>Exercise</a:t>
-            </a:r>
-          </a:p>
-          <a:p>
-            <a:r>
-              <a:rPr lang="en-GB" dirty="0">
-                <a:solidFill>
-                  <a:schemeClr val="bg2">
-                    <a:lumMod val="90000"/>
-                  </a:schemeClr>
-                </a:solidFill>
-              </a:rPr>
-              <a:t>Homework</a:t>
-            </a:r>
-          </a:p>
-          <a:p>
-            <a:r>
-              <a:rPr lang="en-GB" dirty="0">
-                <a:solidFill>
-                  <a:schemeClr val="bg2">
-                    <a:lumMod val="90000"/>
-                  </a:schemeClr>
-                </a:solidFill>
-              </a:rPr>
-              <a:t>Resources</a:t>
-            </a:r>
-          </a:p>
-          <a:p>
             <a:endParaRPr lang="en-GB" dirty="0"/>
+          </a:p>
+          <a:p>
+            <a:pPr marL="0" indent="0">
+              <a:buNone/>
+            </a:pPr>
+            <a:br>
+              <a:rPr lang="en-GB" dirty="0"/>
+            </a:br>
+            <a:endParaRPr lang="en-IT" dirty="0"/>
+          </a:p>
+        </p:txBody>
+      </p:sp>
+      <p:sp>
+        <p:nvSpPr>
+          <p:cNvPr id="4" name="Content Placeholder 2">
+            <a:extLst>
+              <a:ext uri="{FF2B5EF4-FFF2-40B4-BE49-F238E27FC236}">
+                <a16:creationId xmlns:a16="http://schemas.microsoft.com/office/drawing/2014/main" id="{03191784-8C7D-5A41-BA03-B01CD477EA93}"/>
+              </a:ext>
+            </a:extLst>
+          </p:cNvPr>
+          <p:cNvSpPr txBox="1">
+            <a:spLocks/>
+          </p:cNvSpPr>
+          <p:nvPr/>
+        </p:nvSpPr>
+        <p:spPr>
+          <a:xfrm>
+            <a:off x="428171" y="1361167"/>
+            <a:ext cx="10913119" cy="5334907"/>
+          </a:xfrm>
+          <a:prstGeom prst="rect">
+            <a:avLst/>
+          </a:prstGeom>
+        </p:spPr>
+        <p:txBody>
+          <a:bodyPr vert="horz" lIns="91440" tIns="45720" rIns="91440" bIns="45720" rtlCol="0">
+            <a:normAutofit/>
+          </a:bodyPr>
+          <a:lstStyle>
+            <a:lvl1pPr marL="342900" indent="-342900" algn="l" defTabSz="914400" rtl="0" eaLnBrk="1" latinLnBrk="0" hangingPunct="1">
+              <a:lnSpc>
+                <a:spcPct val="90000"/>
+              </a:lnSpc>
+              <a:spcBef>
+                <a:spcPts val="1000"/>
+              </a:spcBef>
+              <a:buClr>
+                <a:srgbClr val="00B050"/>
+              </a:buClr>
+              <a:buFont typeface="Wingdings" panose="05000000000000000000" pitchFamily="2" charset="2"/>
+              <a:buChar char="Ø"/>
+              <a:defRPr sz="2400" kern="1200">
+                <a:solidFill>
+                  <a:schemeClr val="tx1"/>
+                </a:solidFill>
+                <a:latin typeface="Palatino Linotype" panose="02040502050505030304" pitchFamily="18" charset="0"/>
+                <a:ea typeface="+mn-ea"/>
+                <a:cs typeface="+mn-cs"/>
+              </a:defRPr>
+            </a:lvl1pPr>
+            <a:lvl2pPr marL="685800" indent="-228600" algn="l" defTabSz="914400" rtl="0" eaLnBrk="1" latinLnBrk="0" hangingPunct="1">
+              <a:lnSpc>
+                <a:spcPct val="90000"/>
+              </a:lnSpc>
+              <a:spcBef>
+                <a:spcPts val="500"/>
+              </a:spcBef>
+              <a:buClr>
+                <a:srgbClr val="00B050"/>
+              </a:buClr>
+              <a:buFont typeface="Wingdings" panose="05000000000000000000" pitchFamily="2" charset="2"/>
+              <a:buChar char="§"/>
+              <a:defRPr sz="2000" kern="1200">
+                <a:solidFill>
+                  <a:schemeClr val="tx1"/>
+                </a:solidFill>
+                <a:latin typeface="Palatino Linotype" panose="02040502050505030304" pitchFamily="18" charset="0"/>
+                <a:ea typeface="+mn-ea"/>
+                <a:cs typeface="+mn-cs"/>
+              </a:defRPr>
+            </a:lvl2pPr>
+            <a:lvl3pPr marL="1143000" indent="-228600" algn="l" defTabSz="914400" rtl="0" eaLnBrk="1" latinLnBrk="0" hangingPunct="1">
+              <a:lnSpc>
+                <a:spcPct val="90000"/>
+              </a:lnSpc>
+              <a:spcBef>
+                <a:spcPts val="500"/>
+              </a:spcBef>
+              <a:buClr>
+                <a:srgbClr val="00B050"/>
+              </a:buClr>
+              <a:buFont typeface="Arial" panose="020B0604020202020204" pitchFamily="34" charset="0"/>
+              <a:buChar char="•"/>
+              <a:defRPr sz="1800" kern="1200">
+                <a:solidFill>
+                  <a:schemeClr val="tx1"/>
+                </a:solidFill>
+                <a:latin typeface="Palatino Linotype" panose="02040502050505030304" pitchFamily="18" charset="0"/>
+                <a:ea typeface="+mn-ea"/>
+                <a:cs typeface="+mn-cs"/>
+              </a:defRPr>
+            </a:lvl3pPr>
+            <a:lvl4pPr marL="1600200" indent="-228600" algn="l" defTabSz="914400" rtl="0" eaLnBrk="1" latinLnBrk="0" hangingPunct="1">
+              <a:lnSpc>
+                <a:spcPct val="90000"/>
+              </a:lnSpc>
+              <a:spcBef>
+                <a:spcPts val="500"/>
+              </a:spcBef>
+              <a:buClr>
+                <a:srgbClr val="00B050"/>
+              </a:buClr>
+              <a:buFont typeface="Courier New" panose="02070309020205020404" pitchFamily="49" charset="0"/>
+              <a:buChar char="o"/>
+              <a:defRPr sz="1600" kern="1200">
+                <a:solidFill>
+                  <a:schemeClr val="tx1"/>
+                </a:solidFill>
+                <a:latin typeface="Palatino Linotype" panose="02040502050505030304" pitchFamily="18" charset="0"/>
+                <a:ea typeface="+mn-ea"/>
+                <a:cs typeface="+mn-cs"/>
+              </a:defRPr>
+            </a:lvl4pPr>
+            <a:lvl5pPr marL="2057400" indent="-228600" algn="l" defTabSz="914400" rtl="0" eaLnBrk="1" latinLnBrk="0" hangingPunct="1">
+              <a:lnSpc>
+                <a:spcPct val="90000"/>
+              </a:lnSpc>
+              <a:spcBef>
+                <a:spcPts val="500"/>
+              </a:spcBef>
+              <a:buClr>
+                <a:srgbClr val="00B050"/>
+              </a:buClr>
+              <a:buFont typeface="Times New Roman" panose="02020603050405020304" pitchFamily="18" charset="0"/>
+              <a:buChar char="̶"/>
+              <a:defRPr sz="1600" kern="1200">
+                <a:solidFill>
+                  <a:schemeClr val="tx1"/>
+                </a:solidFill>
+                <a:latin typeface="Palatino Linotype" panose="02040502050505030304" pitchFamily="18" charset="0"/>
+                <a:ea typeface="+mn-ea"/>
+                <a:cs typeface="+mn-cs"/>
+              </a:defRPr>
+            </a:lvl5pPr>
+            <a:lvl6pPr marL="2514600" indent="-228600" algn="l" defTabSz="914400" rtl="0" eaLnBrk="1" latinLnBrk="0" hangingPunct="1">
+              <a:lnSpc>
+                <a:spcPct val="90000"/>
+              </a:lnSpc>
+              <a:spcBef>
+                <a:spcPts val="500"/>
+              </a:spcBef>
+              <a:buFont typeface="Arial" panose="020B0604020202020204" pitchFamily="34" charset="0"/>
+              <a:buChar char="•"/>
+              <a:defRPr sz="1800" kern="1200">
+                <a:solidFill>
+                  <a:schemeClr val="tx1"/>
+                </a:solidFill>
+                <a:latin typeface="+mn-lt"/>
+                <a:ea typeface="+mn-ea"/>
+                <a:cs typeface="+mn-cs"/>
+              </a:defRPr>
+            </a:lvl6pPr>
+            <a:lvl7pPr marL="2971800" indent="-228600" algn="l" defTabSz="914400" rtl="0" eaLnBrk="1" latinLnBrk="0" hangingPunct="1">
+              <a:lnSpc>
+                <a:spcPct val="90000"/>
+              </a:lnSpc>
+              <a:spcBef>
+                <a:spcPts val="500"/>
+              </a:spcBef>
+              <a:buFont typeface="Arial" panose="020B0604020202020204" pitchFamily="34" charset="0"/>
+              <a:buChar char="•"/>
+              <a:defRPr sz="1800" kern="1200">
+                <a:solidFill>
+                  <a:schemeClr val="tx1"/>
+                </a:solidFill>
+                <a:latin typeface="+mn-lt"/>
+                <a:ea typeface="+mn-ea"/>
+                <a:cs typeface="+mn-cs"/>
+              </a:defRPr>
+            </a:lvl7pPr>
+            <a:lvl8pPr marL="3429000" indent="-228600" algn="l" defTabSz="914400" rtl="0" eaLnBrk="1" latinLnBrk="0" hangingPunct="1">
+              <a:lnSpc>
+                <a:spcPct val="90000"/>
+              </a:lnSpc>
+              <a:spcBef>
+                <a:spcPts val="500"/>
+              </a:spcBef>
+              <a:buFont typeface="Arial" panose="020B0604020202020204" pitchFamily="34" charset="0"/>
+              <a:buChar char="•"/>
+              <a:defRPr sz="1800" kern="1200">
+                <a:solidFill>
+                  <a:schemeClr val="tx1"/>
+                </a:solidFill>
+                <a:latin typeface="+mn-lt"/>
+                <a:ea typeface="+mn-ea"/>
+                <a:cs typeface="+mn-cs"/>
+              </a:defRPr>
+            </a:lvl8pPr>
+            <a:lvl9pPr marL="3886200" indent="-228600" algn="l" defTabSz="914400" rtl="0" eaLnBrk="1" latinLnBrk="0" hangingPunct="1">
+              <a:lnSpc>
+                <a:spcPct val="90000"/>
+              </a:lnSpc>
+              <a:spcBef>
+                <a:spcPts val="500"/>
+              </a:spcBef>
+              <a:buFont typeface="Arial" panose="020B0604020202020204" pitchFamily="34" charset="0"/>
+              <a:buChar char="•"/>
+              <a:defRPr sz="1800" kern="1200">
+                <a:solidFill>
+                  <a:schemeClr val="tx1"/>
+                </a:solidFill>
+                <a:latin typeface="+mn-lt"/>
+                <a:ea typeface="+mn-ea"/>
+                <a:cs typeface="+mn-cs"/>
+              </a:defRPr>
+            </a:lvl9pPr>
+          </a:lstStyle>
+          <a:p>
+            <a:r>
+              <a:rPr lang="en-US" dirty="0"/>
+              <a:t>Get familiar with the example</a:t>
+            </a:r>
+          </a:p>
+          <a:p>
+            <a:endParaRPr lang="en-US" dirty="0"/>
+          </a:p>
+          <a:p>
+            <a:r>
+              <a:rPr lang="en-US" dirty="0"/>
+              <a:t>Try to integrate the authorization flow in your project </a:t>
+            </a:r>
           </a:p>
         </p:txBody>
       </p:sp>
     </p:spTree>
     <p:extLst>
       <p:ext uri="{BB962C8B-B14F-4D97-AF65-F5344CB8AC3E}">
-        <p14:creationId xmlns:p14="http://schemas.microsoft.com/office/powerpoint/2010/main" val="1809343629"/>
+        <p14:creationId xmlns:p14="http://schemas.microsoft.com/office/powerpoint/2010/main" val="2608999866"/>
       </p:ext>
     </p:extLst>
   </p:cSld>
@@ -6763,7 +6405,7 @@
           <a:p>
             <a:r>
               <a:rPr lang="en-IT" dirty="0"/>
-              <a:t>Exercise </a:t>
+              <a:t>Outline</a:t>
             </a:r>
           </a:p>
         </p:txBody>
@@ -6796,246 +6438,104 @@
           </a:bodyPr>
           <a:lstStyle/>
           <a:p>
-            <a:endParaRPr lang="en-GB" dirty="0"/>
+            <a:r>
+              <a:rPr lang="en-GB" dirty="0">
+                <a:solidFill>
+                  <a:schemeClr val="bg2">
+                    <a:lumMod val="90000"/>
+                  </a:schemeClr>
+                </a:solidFill>
+              </a:rPr>
+              <a:t>Recap</a:t>
+            </a:r>
+          </a:p>
+          <a:p>
+            <a:r>
+              <a:rPr lang="en-GB" dirty="0">
+                <a:solidFill>
+                  <a:schemeClr val="bg2">
+                    <a:lumMod val="90000"/>
+                  </a:schemeClr>
+                </a:solidFill>
+              </a:rPr>
+              <a:t>The flow</a:t>
+            </a:r>
+          </a:p>
+          <a:p>
+            <a:r>
+              <a:rPr lang="en-GB" dirty="0">
+                <a:solidFill>
+                  <a:schemeClr val="bg2">
+                    <a:lumMod val="90000"/>
+                  </a:schemeClr>
+                </a:solidFill>
+              </a:rPr>
+              <a:t>RESTful API in practice</a:t>
+            </a:r>
+          </a:p>
+          <a:p>
+            <a:r>
+              <a:rPr lang="en-GB" dirty="0">
+                <a:solidFill>
+                  <a:schemeClr val="bg2">
+                    <a:lumMod val="90000"/>
+                  </a:schemeClr>
+                </a:solidFill>
+              </a:rPr>
+              <a:t>Case study</a:t>
+            </a:r>
           </a:p>
           <a:p>
             <a:pPr marL="0" indent="0">
               <a:buNone/>
             </a:pPr>
-            <a:br>
-              <a:rPr lang="en-GB" dirty="0"/>
-            </a:br>
-            <a:endParaRPr lang="en-IT" dirty="0"/>
-          </a:p>
-        </p:txBody>
-      </p:sp>
-      <p:sp>
-        <p:nvSpPr>
-          <p:cNvPr id="4" name="Content Placeholder 2">
-            <a:extLst>
-              <a:ext uri="{FF2B5EF4-FFF2-40B4-BE49-F238E27FC236}">
-                <a16:creationId xmlns:a16="http://schemas.microsoft.com/office/drawing/2014/main" id="{03191784-8C7D-5A41-BA03-B01CD477EA93}"/>
-              </a:ext>
-            </a:extLst>
-          </p:cNvPr>
-          <p:cNvSpPr txBox="1">
-            <a:spLocks/>
-          </p:cNvSpPr>
-          <p:nvPr/>
-        </p:nvSpPr>
-        <p:spPr>
-          <a:xfrm>
-            <a:off x="428171" y="1361167"/>
-            <a:ext cx="10913119" cy="5334907"/>
-          </a:xfrm>
-          <a:prstGeom prst="rect">
-            <a:avLst/>
-          </a:prstGeom>
-        </p:spPr>
-        <p:txBody>
-          <a:bodyPr vert="horz" lIns="91440" tIns="45720" rIns="91440" bIns="45720" rtlCol="0">
-            <a:normAutofit/>
-          </a:bodyPr>
-          <a:lstStyle>
-            <a:lvl1pPr marL="342900" indent="-342900" algn="l" defTabSz="914400" rtl="0" eaLnBrk="1" latinLnBrk="0" hangingPunct="1">
-              <a:lnSpc>
-                <a:spcPct val="90000"/>
-              </a:lnSpc>
-              <a:spcBef>
-                <a:spcPts val="1000"/>
-              </a:spcBef>
-              <a:buClr>
-                <a:srgbClr val="00B050"/>
-              </a:buClr>
-              <a:buFont typeface="Wingdings" panose="05000000000000000000" pitchFamily="2" charset="2"/>
-              <a:buChar char="Ø"/>
-              <a:defRPr sz="2400" kern="1200">
-                <a:solidFill>
-                  <a:schemeClr val="tx1"/>
-                </a:solidFill>
-                <a:latin typeface="Palatino Linotype" panose="02040502050505030304" pitchFamily="18" charset="0"/>
-                <a:ea typeface="+mn-ea"/>
-                <a:cs typeface="+mn-cs"/>
-              </a:defRPr>
-            </a:lvl1pPr>
-            <a:lvl2pPr marL="685800" indent="-228600" algn="l" defTabSz="914400" rtl="0" eaLnBrk="1" latinLnBrk="0" hangingPunct="1">
-              <a:lnSpc>
-                <a:spcPct val="90000"/>
-              </a:lnSpc>
-              <a:spcBef>
-                <a:spcPts val="500"/>
-              </a:spcBef>
-              <a:buClr>
-                <a:srgbClr val="00B050"/>
-              </a:buClr>
-              <a:buFont typeface="Wingdings" panose="05000000000000000000" pitchFamily="2" charset="2"/>
-              <a:buChar char="§"/>
-              <a:defRPr sz="2000" kern="1200">
-                <a:solidFill>
-                  <a:schemeClr val="tx1"/>
-                </a:solidFill>
-                <a:latin typeface="Palatino Linotype" panose="02040502050505030304" pitchFamily="18" charset="0"/>
-                <a:ea typeface="+mn-ea"/>
-                <a:cs typeface="+mn-cs"/>
-              </a:defRPr>
-            </a:lvl2pPr>
-            <a:lvl3pPr marL="1143000" indent="-228600" algn="l" defTabSz="914400" rtl="0" eaLnBrk="1" latinLnBrk="0" hangingPunct="1">
-              <a:lnSpc>
-                <a:spcPct val="90000"/>
-              </a:lnSpc>
-              <a:spcBef>
-                <a:spcPts val="500"/>
-              </a:spcBef>
-              <a:buClr>
-                <a:srgbClr val="00B050"/>
-              </a:buClr>
-              <a:buFont typeface="Arial" panose="020B0604020202020204" pitchFamily="34" charset="0"/>
-              <a:buChar char="•"/>
-              <a:defRPr sz="1800" kern="1200">
-                <a:solidFill>
-                  <a:schemeClr val="tx1"/>
-                </a:solidFill>
-                <a:latin typeface="Palatino Linotype" panose="02040502050505030304" pitchFamily="18" charset="0"/>
-                <a:ea typeface="+mn-ea"/>
-                <a:cs typeface="+mn-cs"/>
-              </a:defRPr>
-            </a:lvl3pPr>
-            <a:lvl4pPr marL="1600200" indent="-228600" algn="l" defTabSz="914400" rtl="0" eaLnBrk="1" latinLnBrk="0" hangingPunct="1">
-              <a:lnSpc>
-                <a:spcPct val="90000"/>
-              </a:lnSpc>
-              <a:spcBef>
-                <a:spcPts val="500"/>
-              </a:spcBef>
-              <a:buClr>
-                <a:srgbClr val="00B050"/>
-              </a:buClr>
-              <a:buFont typeface="Courier New" panose="02070309020205020404" pitchFamily="49" charset="0"/>
-              <a:buChar char="o"/>
-              <a:defRPr sz="1600" kern="1200">
-                <a:solidFill>
-                  <a:schemeClr val="tx1"/>
-                </a:solidFill>
-                <a:latin typeface="Palatino Linotype" panose="02040502050505030304" pitchFamily="18" charset="0"/>
-                <a:ea typeface="+mn-ea"/>
-                <a:cs typeface="+mn-cs"/>
-              </a:defRPr>
-            </a:lvl4pPr>
-            <a:lvl5pPr marL="2057400" indent="-228600" algn="l" defTabSz="914400" rtl="0" eaLnBrk="1" latinLnBrk="0" hangingPunct="1">
-              <a:lnSpc>
-                <a:spcPct val="90000"/>
-              </a:lnSpc>
-              <a:spcBef>
-                <a:spcPts val="500"/>
-              </a:spcBef>
-              <a:buClr>
-                <a:srgbClr val="00B050"/>
-              </a:buClr>
-              <a:buFont typeface="Times New Roman" panose="02020603050405020304" pitchFamily="18" charset="0"/>
-              <a:buChar char="̶"/>
-              <a:defRPr sz="1600" kern="1200">
-                <a:solidFill>
-                  <a:schemeClr val="tx1"/>
-                </a:solidFill>
-                <a:latin typeface="Palatino Linotype" panose="02040502050505030304" pitchFamily="18" charset="0"/>
-                <a:ea typeface="+mn-ea"/>
-                <a:cs typeface="+mn-cs"/>
-              </a:defRPr>
-            </a:lvl5pPr>
-            <a:lvl6pPr marL="2514600" indent="-228600" algn="l" defTabSz="914400" rtl="0" eaLnBrk="1" latinLnBrk="0" hangingPunct="1">
-              <a:lnSpc>
-                <a:spcPct val="90000"/>
-              </a:lnSpc>
-              <a:spcBef>
-                <a:spcPts val="500"/>
-              </a:spcBef>
-              <a:buFont typeface="Arial" panose="020B0604020202020204" pitchFamily="34" charset="0"/>
-              <a:buChar char="•"/>
-              <a:defRPr sz="1800" kern="1200">
-                <a:solidFill>
-                  <a:schemeClr val="tx1"/>
-                </a:solidFill>
-                <a:latin typeface="+mn-lt"/>
-                <a:ea typeface="+mn-ea"/>
-                <a:cs typeface="+mn-cs"/>
-              </a:defRPr>
-            </a:lvl6pPr>
-            <a:lvl7pPr marL="2971800" indent="-228600" algn="l" defTabSz="914400" rtl="0" eaLnBrk="1" latinLnBrk="0" hangingPunct="1">
-              <a:lnSpc>
-                <a:spcPct val="90000"/>
-              </a:lnSpc>
-              <a:spcBef>
-                <a:spcPts val="500"/>
-              </a:spcBef>
-              <a:buFont typeface="Arial" panose="020B0604020202020204" pitchFamily="34" charset="0"/>
-              <a:buChar char="•"/>
-              <a:defRPr sz="1800" kern="1200">
-                <a:solidFill>
-                  <a:schemeClr val="tx1"/>
-                </a:solidFill>
-                <a:latin typeface="+mn-lt"/>
-                <a:ea typeface="+mn-ea"/>
-                <a:cs typeface="+mn-cs"/>
-              </a:defRPr>
-            </a:lvl7pPr>
-            <a:lvl8pPr marL="3429000" indent="-228600" algn="l" defTabSz="914400" rtl="0" eaLnBrk="1" latinLnBrk="0" hangingPunct="1">
-              <a:lnSpc>
-                <a:spcPct val="90000"/>
-              </a:lnSpc>
-              <a:spcBef>
-                <a:spcPts val="500"/>
-              </a:spcBef>
-              <a:buFont typeface="Arial" panose="020B0604020202020204" pitchFamily="34" charset="0"/>
-              <a:buChar char="•"/>
-              <a:defRPr sz="1800" kern="1200">
-                <a:solidFill>
-                  <a:schemeClr val="tx1"/>
-                </a:solidFill>
-                <a:latin typeface="+mn-lt"/>
-                <a:ea typeface="+mn-ea"/>
-                <a:cs typeface="+mn-cs"/>
-              </a:defRPr>
-            </a:lvl8pPr>
-            <a:lvl9pPr marL="3886200" indent="-228600" algn="l" defTabSz="914400" rtl="0" eaLnBrk="1" latinLnBrk="0" hangingPunct="1">
-              <a:lnSpc>
-                <a:spcPct val="90000"/>
-              </a:lnSpc>
-              <a:spcBef>
-                <a:spcPts val="500"/>
-              </a:spcBef>
-              <a:buFont typeface="Arial" panose="020B0604020202020204" pitchFamily="34" charset="0"/>
-              <a:buChar char="•"/>
-              <a:defRPr sz="1800" kern="1200">
-                <a:solidFill>
-                  <a:schemeClr val="tx1"/>
-                </a:solidFill>
-                <a:latin typeface="+mn-lt"/>
-                <a:ea typeface="+mn-ea"/>
-                <a:cs typeface="+mn-cs"/>
-              </a:defRPr>
-            </a:lvl9pPr>
-          </a:lstStyle>
-          <a:p>
-            <a:r>
-              <a:rPr lang="en-US" dirty="0"/>
-              <a:t>Get familiar with the example</a:t>
-            </a:r>
-          </a:p>
-          <a:p>
-            <a:endParaRPr lang="en-US" dirty="0"/>
-          </a:p>
-          <a:p>
-            <a:r>
-              <a:rPr lang="en-US" dirty="0"/>
-              <a:t>Try to integrate the authorization flow in your project </a:t>
-            </a:r>
+            <a:endParaRPr lang="en-GB" dirty="0">
+              <a:solidFill>
+                <a:schemeClr val="bg2">
+                  <a:lumMod val="90000"/>
+                </a:schemeClr>
+              </a:solidFill>
+            </a:endParaRPr>
+          </a:p>
+          <a:p>
+            <a:r>
+              <a:rPr lang="en-GB" dirty="0">
+                <a:solidFill>
+                  <a:schemeClr val="bg2">
+                    <a:lumMod val="90000"/>
+                  </a:schemeClr>
+                </a:solidFill>
+              </a:rPr>
+              <a:t>Exercise</a:t>
+            </a:r>
+          </a:p>
+          <a:p>
+            <a:r>
+              <a:rPr lang="en-GB" b="1" dirty="0"/>
+              <a:t>Homework</a:t>
+            </a:r>
+          </a:p>
+          <a:p>
+            <a:r>
+              <a:rPr lang="en-GB" dirty="0">
+                <a:solidFill>
+                  <a:schemeClr val="bg2">
+                    <a:lumMod val="90000"/>
+                  </a:schemeClr>
+                </a:solidFill>
+              </a:rPr>
+              <a:t>Resources</a:t>
+            </a:r>
+          </a:p>
+          <a:p>
+            <a:endParaRPr lang="en-GB" dirty="0"/>
           </a:p>
         </p:txBody>
       </p:sp>
     </p:spTree>
     <p:extLst>
       <p:ext uri="{BB962C8B-B14F-4D97-AF65-F5344CB8AC3E}">
-        <p14:creationId xmlns:p14="http://schemas.microsoft.com/office/powerpoint/2010/main" val="2608999866"/>
+        <p14:creationId xmlns:p14="http://schemas.microsoft.com/office/powerpoint/2010/main" val="1684023765"/>
       </p:ext>
     </p:extLst>
   </p:cSld>
@@ -7085,7 +6585,7 @@
           <a:p>
             <a:r>
               <a:rPr lang="en-IT" dirty="0"/>
-              <a:t>Outline</a:t>
+              <a:t>Homework </a:t>
             </a:r>
           </a:p>
         </p:txBody>
@@ -7118,104 +6618,237 @@
           </a:bodyPr>
           <a:lstStyle/>
           <a:p>
-            <a:r>
-              <a:rPr lang="en-GB" dirty="0">
-                <a:solidFill>
-                  <a:schemeClr val="bg2">
-                    <a:lumMod val="90000"/>
-                  </a:schemeClr>
-                </a:solidFill>
-              </a:rPr>
-              <a:t>Recap</a:t>
-            </a:r>
-          </a:p>
-          <a:p>
-            <a:r>
-              <a:rPr lang="en-GB" dirty="0">
-                <a:solidFill>
-                  <a:schemeClr val="bg2">
-                    <a:lumMod val="90000"/>
-                  </a:schemeClr>
-                </a:solidFill>
-              </a:rPr>
-              <a:t>The flow</a:t>
-            </a:r>
-          </a:p>
-          <a:p>
-            <a:r>
-              <a:rPr lang="en-GB" dirty="0">
-                <a:solidFill>
-                  <a:schemeClr val="bg2">
-                    <a:lumMod val="90000"/>
-                  </a:schemeClr>
-                </a:solidFill>
-              </a:rPr>
-              <a:t>RESTful API in practice</a:t>
-            </a:r>
-          </a:p>
-          <a:p>
-            <a:r>
-              <a:rPr lang="en-GB" dirty="0">
-                <a:solidFill>
-                  <a:schemeClr val="bg2">
-                    <a:lumMod val="90000"/>
-                  </a:schemeClr>
-                </a:solidFill>
-              </a:rPr>
-              <a:t>Case study</a:t>
-            </a:r>
+            <a:endParaRPr lang="en-GB" dirty="0"/>
           </a:p>
           <a:p>
             <a:pPr marL="0" indent="0">
               <a:buNone/>
             </a:pPr>
-            <a:endParaRPr lang="en-GB" dirty="0">
-              <a:solidFill>
-                <a:schemeClr val="bg2">
-                  <a:lumMod val="90000"/>
-                </a:schemeClr>
-              </a:solidFill>
-            </a:endParaRPr>
-          </a:p>
-          <a:p>
-            <a:r>
-              <a:rPr lang="en-GB" dirty="0">
-                <a:solidFill>
-                  <a:schemeClr val="bg2">
-                    <a:lumMod val="90000"/>
-                  </a:schemeClr>
-                </a:solidFill>
-              </a:rPr>
-              <a:t>Exercise</a:t>
-            </a:r>
-          </a:p>
-          <a:p>
-            <a:r>
-              <a:rPr lang="en-GB" b="1" dirty="0"/>
-              <a:t>Homework</a:t>
-            </a:r>
-          </a:p>
-          <a:p>
-            <a:r>
-              <a:rPr lang="en-GB" dirty="0">
-                <a:solidFill>
-                  <a:schemeClr val="bg2">
-                    <a:lumMod val="90000"/>
-                  </a:schemeClr>
-                </a:solidFill>
-              </a:rPr>
-              <a:t>Resources</a:t>
-            </a:r>
-          </a:p>
-          <a:p>
-            <a:endParaRPr lang="en-GB" dirty="0"/>
+            <a:br>
+              <a:rPr lang="en-GB" dirty="0"/>
+            </a:br>
+            <a:endParaRPr lang="en-IT" dirty="0"/>
+          </a:p>
+        </p:txBody>
+      </p:sp>
+      <p:sp>
+        <p:nvSpPr>
+          <p:cNvPr id="4" name="Content Placeholder 2">
+            <a:extLst>
+              <a:ext uri="{FF2B5EF4-FFF2-40B4-BE49-F238E27FC236}">
+                <a16:creationId xmlns:a16="http://schemas.microsoft.com/office/drawing/2014/main" id="{03191784-8C7D-5A41-BA03-B01CD477EA93}"/>
+              </a:ext>
+            </a:extLst>
+          </p:cNvPr>
+          <p:cNvSpPr txBox="1">
+            <a:spLocks/>
+          </p:cNvSpPr>
+          <p:nvPr/>
+        </p:nvSpPr>
+        <p:spPr>
+          <a:xfrm>
+            <a:off x="428171" y="1361167"/>
+            <a:ext cx="10913119" cy="5334907"/>
+          </a:xfrm>
+          <a:prstGeom prst="rect">
+            <a:avLst/>
+          </a:prstGeom>
+        </p:spPr>
+        <p:txBody>
+          <a:bodyPr vert="horz" lIns="91440" tIns="45720" rIns="91440" bIns="45720" rtlCol="0">
+            <a:normAutofit/>
+          </a:bodyPr>
+          <a:lstStyle>
+            <a:lvl1pPr marL="342900" indent="-342900" algn="l" defTabSz="914400" rtl="0" eaLnBrk="1" latinLnBrk="0" hangingPunct="1">
+              <a:lnSpc>
+                <a:spcPct val="90000"/>
+              </a:lnSpc>
+              <a:spcBef>
+                <a:spcPts val="1000"/>
+              </a:spcBef>
+              <a:buClr>
+                <a:srgbClr val="00B050"/>
+              </a:buClr>
+              <a:buFont typeface="Wingdings" panose="05000000000000000000" pitchFamily="2" charset="2"/>
+              <a:buChar char="Ø"/>
+              <a:defRPr sz="2400" kern="1200">
+                <a:solidFill>
+                  <a:schemeClr val="tx1"/>
+                </a:solidFill>
+                <a:latin typeface="Palatino Linotype" panose="02040502050505030304" pitchFamily="18" charset="0"/>
+                <a:ea typeface="+mn-ea"/>
+                <a:cs typeface="+mn-cs"/>
+              </a:defRPr>
+            </a:lvl1pPr>
+            <a:lvl2pPr marL="685800" indent="-228600" algn="l" defTabSz="914400" rtl="0" eaLnBrk="1" latinLnBrk="0" hangingPunct="1">
+              <a:lnSpc>
+                <a:spcPct val="90000"/>
+              </a:lnSpc>
+              <a:spcBef>
+                <a:spcPts val="500"/>
+              </a:spcBef>
+              <a:buClr>
+                <a:srgbClr val="00B050"/>
+              </a:buClr>
+              <a:buFont typeface="Wingdings" panose="05000000000000000000" pitchFamily="2" charset="2"/>
+              <a:buChar char="§"/>
+              <a:defRPr sz="2000" kern="1200">
+                <a:solidFill>
+                  <a:schemeClr val="tx1"/>
+                </a:solidFill>
+                <a:latin typeface="Palatino Linotype" panose="02040502050505030304" pitchFamily="18" charset="0"/>
+                <a:ea typeface="+mn-ea"/>
+                <a:cs typeface="+mn-cs"/>
+              </a:defRPr>
+            </a:lvl2pPr>
+            <a:lvl3pPr marL="1143000" indent="-228600" algn="l" defTabSz="914400" rtl="0" eaLnBrk="1" latinLnBrk="0" hangingPunct="1">
+              <a:lnSpc>
+                <a:spcPct val="90000"/>
+              </a:lnSpc>
+              <a:spcBef>
+                <a:spcPts val="500"/>
+              </a:spcBef>
+              <a:buClr>
+                <a:srgbClr val="00B050"/>
+              </a:buClr>
+              <a:buFont typeface="Arial" panose="020B0604020202020204" pitchFamily="34" charset="0"/>
+              <a:buChar char="•"/>
+              <a:defRPr sz="1800" kern="1200">
+                <a:solidFill>
+                  <a:schemeClr val="tx1"/>
+                </a:solidFill>
+                <a:latin typeface="Palatino Linotype" panose="02040502050505030304" pitchFamily="18" charset="0"/>
+                <a:ea typeface="+mn-ea"/>
+                <a:cs typeface="+mn-cs"/>
+              </a:defRPr>
+            </a:lvl3pPr>
+            <a:lvl4pPr marL="1600200" indent="-228600" algn="l" defTabSz="914400" rtl="0" eaLnBrk="1" latinLnBrk="0" hangingPunct="1">
+              <a:lnSpc>
+                <a:spcPct val="90000"/>
+              </a:lnSpc>
+              <a:spcBef>
+                <a:spcPts val="500"/>
+              </a:spcBef>
+              <a:buClr>
+                <a:srgbClr val="00B050"/>
+              </a:buClr>
+              <a:buFont typeface="Courier New" panose="02070309020205020404" pitchFamily="49" charset="0"/>
+              <a:buChar char="o"/>
+              <a:defRPr sz="1600" kern="1200">
+                <a:solidFill>
+                  <a:schemeClr val="tx1"/>
+                </a:solidFill>
+                <a:latin typeface="Palatino Linotype" panose="02040502050505030304" pitchFamily="18" charset="0"/>
+                <a:ea typeface="+mn-ea"/>
+                <a:cs typeface="+mn-cs"/>
+              </a:defRPr>
+            </a:lvl4pPr>
+            <a:lvl5pPr marL="2057400" indent="-228600" algn="l" defTabSz="914400" rtl="0" eaLnBrk="1" latinLnBrk="0" hangingPunct="1">
+              <a:lnSpc>
+                <a:spcPct val="90000"/>
+              </a:lnSpc>
+              <a:spcBef>
+                <a:spcPts val="500"/>
+              </a:spcBef>
+              <a:buClr>
+                <a:srgbClr val="00B050"/>
+              </a:buClr>
+              <a:buFont typeface="Times New Roman" panose="02020603050405020304" pitchFamily="18" charset="0"/>
+              <a:buChar char="̶"/>
+              <a:defRPr sz="1600" kern="1200">
+                <a:solidFill>
+                  <a:schemeClr val="tx1"/>
+                </a:solidFill>
+                <a:latin typeface="Palatino Linotype" panose="02040502050505030304" pitchFamily="18" charset="0"/>
+                <a:ea typeface="+mn-ea"/>
+                <a:cs typeface="+mn-cs"/>
+              </a:defRPr>
+            </a:lvl5pPr>
+            <a:lvl6pPr marL="2514600" indent="-228600" algn="l" defTabSz="914400" rtl="0" eaLnBrk="1" latinLnBrk="0" hangingPunct="1">
+              <a:lnSpc>
+                <a:spcPct val="90000"/>
+              </a:lnSpc>
+              <a:spcBef>
+                <a:spcPts val="500"/>
+              </a:spcBef>
+              <a:buFont typeface="Arial" panose="020B0604020202020204" pitchFamily="34" charset="0"/>
+              <a:buChar char="•"/>
+              <a:defRPr sz="1800" kern="1200">
+                <a:solidFill>
+                  <a:schemeClr val="tx1"/>
+                </a:solidFill>
+                <a:latin typeface="+mn-lt"/>
+                <a:ea typeface="+mn-ea"/>
+                <a:cs typeface="+mn-cs"/>
+              </a:defRPr>
+            </a:lvl6pPr>
+            <a:lvl7pPr marL="2971800" indent="-228600" algn="l" defTabSz="914400" rtl="0" eaLnBrk="1" latinLnBrk="0" hangingPunct="1">
+              <a:lnSpc>
+                <a:spcPct val="90000"/>
+              </a:lnSpc>
+              <a:spcBef>
+                <a:spcPts val="500"/>
+              </a:spcBef>
+              <a:buFont typeface="Arial" panose="020B0604020202020204" pitchFamily="34" charset="0"/>
+              <a:buChar char="•"/>
+              <a:defRPr sz="1800" kern="1200">
+                <a:solidFill>
+                  <a:schemeClr val="tx1"/>
+                </a:solidFill>
+                <a:latin typeface="+mn-lt"/>
+                <a:ea typeface="+mn-ea"/>
+                <a:cs typeface="+mn-cs"/>
+              </a:defRPr>
+            </a:lvl7pPr>
+            <a:lvl8pPr marL="3429000" indent="-228600" algn="l" defTabSz="914400" rtl="0" eaLnBrk="1" latinLnBrk="0" hangingPunct="1">
+              <a:lnSpc>
+                <a:spcPct val="90000"/>
+              </a:lnSpc>
+              <a:spcBef>
+                <a:spcPts val="500"/>
+              </a:spcBef>
+              <a:buFont typeface="Arial" panose="020B0604020202020204" pitchFamily="34" charset="0"/>
+              <a:buChar char="•"/>
+              <a:defRPr sz="1800" kern="1200">
+                <a:solidFill>
+                  <a:schemeClr val="tx1"/>
+                </a:solidFill>
+                <a:latin typeface="+mn-lt"/>
+                <a:ea typeface="+mn-ea"/>
+                <a:cs typeface="+mn-cs"/>
+              </a:defRPr>
+            </a:lvl8pPr>
+            <a:lvl9pPr marL="3886200" indent="-228600" algn="l" defTabSz="914400" rtl="0" eaLnBrk="1" latinLnBrk="0" hangingPunct="1">
+              <a:lnSpc>
+                <a:spcPct val="90000"/>
+              </a:lnSpc>
+              <a:spcBef>
+                <a:spcPts val="500"/>
+              </a:spcBef>
+              <a:buFont typeface="Arial" panose="020B0604020202020204" pitchFamily="34" charset="0"/>
+              <a:buChar char="•"/>
+              <a:defRPr sz="1800" kern="1200">
+                <a:solidFill>
+                  <a:schemeClr val="tx1"/>
+                </a:solidFill>
+                <a:latin typeface="+mn-lt"/>
+                <a:ea typeface="+mn-ea"/>
+                <a:cs typeface="+mn-cs"/>
+              </a:defRPr>
+            </a:lvl9pPr>
+          </a:lstStyle>
+          <a:p>
+            <a:r>
+              <a:rPr lang="en-US" dirty="0"/>
+              <a:t>Get familiar with the http package</a:t>
+            </a:r>
           </a:p>
         </p:txBody>
       </p:sp>
     </p:spTree>
     <p:extLst>
       <p:ext uri="{BB962C8B-B14F-4D97-AF65-F5344CB8AC3E}">
-        <p14:creationId xmlns:p14="http://schemas.microsoft.com/office/powerpoint/2010/main" val="1684023765"/>
+        <p14:creationId xmlns:p14="http://schemas.microsoft.com/office/powerpoint/2010/main" val="895378464"/>
       </p:ext>
     </p:extLst>
   </p:cSld>
@@ -7265,7 +6898,7 @@
           <a:p>
             <a:r>
               <a:rPr lang="en-IT" dirty="0"/>
-              <a:t>Homework </a:t>
+              <a:t>Outline</a:t>
             </a:r>
           </a:p>
         </p:txBody>
@@ -7298,319 +6931,6 @@
           </a:bodyPr>
           <a:lstStyle/>
           <a:p>
-            <a:endParaRPr lang="en-GB" dirty="0"/>
-          </a:p>
-          <a:p>
-            <a:pPr marL="0" indent="0">
-              <a:buNone/>
-            </a:pPr>
-            <a:br>
-              <a:rPr lang="en-GB" dirty="0"/>
-            </a:br>
-            <a:endParaRPr lang="en-IT" dirty="0"/>
-          </a:p>
-        </p:txBody>
-      </p:sp>
-      <p:sp>
-        <p:nvSpPr>
-          <p:cNvPr id="4" name="Content Placeholder 2">
-            <a:extLst>
-              <a:ext uri="{FF2B5EF4-FFF2-40B4-BE49-F238E27FC236}">
-                <a16:creationId xmlns:a16="http://schemas.microsoft.com/office/drawing/2014/main" id="{03191784-8C7D-5A41-BA03-B01CD477EA93}"/>
-              </a:ext>
-            </a:extLst>
-          </p:cNvPr>
-          <p:cNvSpPr txBox="1">
-            <a:spLocks/>
-          </p:cNvSpPr>
-          <p:nvPr/>
-        </p:nvSpPr>
-        <p:spPr>
-          <a:xfrm>
-            <a:off x="428171" y="1361167"/>
-            <a:ext cx="10913119" cy="5334907"/>
-          </a:xfrm>
-          <a:prstGeom prst="rect">
-            <a:avLst/>
-          </a:prstGeom>
-        </p:spPr>
-        <p:txBody>
-          <a:bodyPr vert="horz" lIns="91440" tIns="45720" rIns="91440" bIns="45720" rtlCol="0">
-            <a:normAutofit/>
-          </a:bodyPr>
-          <a:lstStyle>
-            <a:lvl1pPr marL="342900" indent="-342900" algn="l" defTabSz="914400" rtl="0" eaLnBrk="1" latinLnBrk="0" hangingPunct="1">
-              <a:lnSpc>
-                <a:spcPct val="90000"/>
-              </a:lnSpc>
-              <a:spcBef>
-                <a:spcPts val="1000"/>
-              </a:spcBef>
-              <a:buClr>
-                <a:srgbClr val="00B050"/>
-              </a:buClr>
-              <a:buFont typeface="Wingdings" panose="05000000000000000000" pitchFamily="2" charset="2"/>
-              <a:buChar char="Ø"/>
-              <a:defRPr sz="2400" kern="1200">
-                <a:solidFill>
-                  <a:schemeClr val="tx1"/>
-                </a:solidFill>
-                <a:latin typeface="Palatino Linotype" panose="02040502050505030304" pitchFamily="18" charset="0"/>
-                <a:ea typeface="+mn-ea"/>
-                <a:cs typeface="+mn-cs"/>
-              </a:defRPr>
-            </a:lvl1pPr>
-            <a:lvl2pPr marL="685800" indent="-228600" algn="l" defTabSz="914400" rtl="0" eaLnBrk="1" latinLnBrk="0" hangingPunct="1">
-              <a:lnSpc>
-                <a:spcPct val="90000"/>
-              </a:lnSpc>
-              <a:spcBef>
-                <a:spcPts val="500"/>
-              </a:spcBef>
-              <a:buClr>
-                <a:srgbClr val="00B050"/>
-              </a:buClr>
-              <a:buFont typeface="Wingdings" panose="05000000000000000000" pitchFamily="2" charset="2"/>
-              <a:buChar char="§"/>
-              <a:defRPr sz="2000" kern="1200">
-                <a:solidFill>
-                  <a:schemeClr val="tx1"/>
-                </a:solidFill>
-                <a:latin typeface="Palatino Linotype" panose="02040502050505030304" pitchFamily="18" charset="0"/>
-                <a:ea typeface="+mn-ea"/>
-                <a:cs typeface="+mn-cs"/>
-              </a:defRPr>
-            </a:lvl2pPr>
-            <a:lvl3pPr marL="1143000" indent="-228600" algn="l" defTabSz="914400" rtl="0" eaLnBrk="1" latinLnBrk="0" hangingPunct="1">
-              <a:lnSpc>
-                <a:spcPct val="90000"/>
-              </a:lnSpc>
-              <a:spcBef>
-                <a:spcPts val="500"/>
-              </a:spcBef>
-              <a:buClr>
-                <a:srgbClr val="00B050"/>
-              </a:buClr>
-              <a:buFont typeface="Arial" panose="020B0604020202020204" pitchFamily="34" charset="0"/>
-              <a:buChar char="•"/>
-              <a:defRPr sz="1800" kern="1200">
-                <a:solidFill>
-                  <a:schemeClr val="tx1"/>
-                </a:solidFill>
-                <a:latin typeface="Palatino Linotype" panose="02040502050505030304" pitchFamily="18" charset="0"/>
-                <a:ea typeface="+mn-ea"/>
-                <a:cs typeface="+mn-cs"/>
-              </a:defRPr>
-            </a:lvl3pPr>
-            <a:lvl4pPr marL="1600200" indent="-228600" algn="l" defTabSz="914400" rtl="0" eaLnBrk="1" latinLnBrk="0" hangingPunct="1">
-              <a:lnSpc>
-                <a:spcPct val="90000"/>
-              </a:lnSpc>
-              <a:spcBef>
-                <a:spcPts val="500"/>
-              </a:spcBef>
-              <a:buClr>
-                <a:srgbClr val="00B050"/>
-              </a:buClr>
-              <a:buFont typeface="Courier New" panose="02070309020205020404" pitchFamily="49" charset="0"/>
-              <a:buChar char="o"/>
-              <a:defRPr sz="1600" kern="1200">
-                <a:solidFill>
-                  <a:schemeClr val="tx1"/>
-                </a:solidFill>
-                <a:latin typeface="Palatino Linotype" panose="02040502050505030304" pitchFamily="18" charset="0"/>
-                <a:ea typeface="+mn-ea"/>
-                <a:cs typeface="+mn-cs"/>
-              </a:defRPr>
-            </a:lvl4pPr>
-            <a:lvl5pPr marL="2057400" indent="-228600" algn="l" defTabSz="914400" rtl="0" eaLnBrk="1" latinLnBrk="0" hangingPunct="1">
-              <a:lnSpc>
-                <a:spcPct val="90000"/>
-              </a:lnSpc>
-              <a:spcBef>
-                <a:spcPts val="500"/>
-              </a:spcBef>
-              <a:buClr>
-                <a:srgbClr val="00B050"/>
-              </a:buClr>
-              <a:buFont typeface="Times New Roman" panose="02020603050405020304" pitchFamily="18" charset="0"/>
-              <a:buChar char="̶"/>
-              <a:defRPr sz="1600" kern="1200">
-                <a:solidFill>
-                  <a:schemeClr val="tx1"/>
-                </a:solidFill>
-                <a:latin typeface="Palatino Linotype" panose="02040502050505030304" pitchFamily="18" charset="0"/>
-                <a:ea typeface="+mn-ea"/>
-                <a:cs typeface="+mn-cs"/>
-              </a:defRPr>
-            </a:lvl5pPr>
-            <a:lvl6pPr marL="2514600" indent="-228600" algn="l" defTabSz="914400" rtl="0" eaLnBrk="1" latinLnBrk="0" hangingPunct="1">
-              <a:lnSpc>
-                <a:spcPct val="90000"/>
-              </a:lnSpc>
-              <a:spcBef>
-                <a:spcPts val="500"/>
-              </a:spcBef>
-              <a:buFont typeface="Arial" panose="020B0604020202020204" pitchFamily="34" charset="0"/>
-              <a:buChar char="•"/>
-              <a:defRPr sz="1800" kern="1200">
-                <a:solidFill>
-                  <a:schemeClr val="tx1"/>
-                </a:solidFill>
-                <a:latin typeface="+mn-lt"/>
-                <a:ea typeface="+mn-ea"/>
-                <a:cs typeface="+mn-cs"/>
-              </a:defRPr>
-            </a:lvl6pPr>
-            <a:lvl7pPr marL="2971800" indent="-228600" algn="l" defTabSz="914400" rtl="0" eaLnBrk="1" latinLnBrk="0" hangingPunct="1">
-              <a:lnSpc>
-                <a:spcPct val="90000"/>
-              </a:lnSpc>
-              <a:spcBef>
-                <a:spcPts val="500"/>
-              </a:spcBef>
-              <a:buFont typeface="Arial" panose="020B0604020202020204" pitchFamily="34" charset="0"/>
-              <a:buChar char="•"/>
-              <a:defRPr sz="1800" kern="1200">
-                <a:solidFill>
-                  <a:schemeClr val="tx1"/>
-                </a:solidFill>
-                <a:latin typeface="+mn-lt"/>
-                <a:ea typeface="+mn-ea"/>
-                <a:cs typeface="+mn-cs"/>
-              </a:defRPr>
-            </a:lvl7pPr>
-            <a:lvl8pPr marL="3429000" indent="-228600" algn="l" defTabSz="914400" rtl="0" eaLnBrk="1" latinLnBrk="0" hangingPunct="1">
-              <a:lnSpc>
-                <a:spcPct val="90000"/>
-              </a:lnSpc>
-              <a:spcBef>
-                <a:spcPts val="500"/>
-              </a:spcBef>
-              <a:buFont typeface="Arial" panose="020B0604020202020204" pitchFamily="34" charset="0"/>
-              <a:buChar char="•"/>
-              <a:defRPr sz="1800" kern="1200">
-                <a:solidFill>
-                  <a:schemeClr val="tx1"/>
-                </a:solidFill>
-                <a:latin typeface="+mn-lt"/>
-                <a:ea typeface="+mn-ea"/>
-                <a:cs typeface="+mn-cs"/>
-              </a:defRPr>
-            </a:lvl8pPr>
-            <a:lvl9pPr marL="3886200" indent="-228600" algn="l" defTabSz="914400" rtl="0" eaLnBrk="1" latinLnBrk="0" hangingPunct="1">
-              <a:lnSpc>
-                <a:spcPct val="90000"/>
-              </a:lnSpc>
-              <a:spcBef>
-                <a:spcPts val="500"/>
-              </a:spcBef>
-              <a:buFont typeface="Arial" panose="020B0604020202020204" pitchFamily="34" charset="0"/>
-              <a:buChar char="•"/>
-              <a:defRPr sz="1800" kern="1200">
-                <a:solidFill>
-                  <a:schemeClr val="tx1"/>
-                </a:solidFill>
-                <a:latin typeface="+mn-lt"/>
-                <a:ea typeface="+mn-ea"/>
-                <a:cs typeface="+mn-cs"/>
-              </a:defRPr>
-            </a:lvl9pPr>
-          </a:lstStyle>
-          <a:p>
-            <a:r>
-              <a:rPr lang="en-US" dirty="0"/>
-              <a:t>Get familiar with the http package</a:t>
-            </a:r>
-          </a:p>
-        </p:txBody>
-      </p:sp>
-    </p:spTree>
-    <p:extLst>
-      <p:ext uri="{BB962C8B-B14F-4D97-AF65-F5344CB8AC3E}">
-        <p14:creationId xmlns:p14="http://schemas.microsoft.com/office/powerpoint/2010/main" val="895378464"/>
-      </p:ext>
-    </p:extLst>
-  </p:cSld>
-  <p:clrMapOvr>
-    <a:masterClrMapping/>
-  </p:clrMapOvr>
-</p:sld>
-</file>
-
-<file path=ppt/slides/slide24.xml><?xml version="1.0" encoding="utf-8"?>
-<p:sld xmlns:a="http://schemas.openxmlformats.org/drawingml/2006/main" xmlns:r="http://schemas.openxmlformats.org/officeDocument/2006/relationships" xmlns:p="http://schemas.openxmlformats.org/presentationml/2006/main">
-  <p:cSld>
-    <p:spTree>
-      <p:nvGrpSpPr>
-        <p:cNvPr id="1" name=""/>
-        <p:cNvGrpSpPr/>
-        <p:nvPr/>
-      </p:nvGrpSpPr>
-      <p:grpSpPr>
-        <a:xfrm>
-          <a:off x="0" y="0"/>
-          <a:ext cx="0" cy="0"/>
-          <a:chOff x="0" y="0"/>
-          <a:chExt cx="0" cy="0"/>
-        </a:xfrm>
-      </p:grpSpPr>
-      <p:sp>
-        <p:nvSpPr>
-          <p:cNvPr id="2" name="Title 1">
-            <a:extLst>
-              <a:ext uri="{FF2B5EF4-FFF2-40B4-BE49-F238E27FC236}">
-                <a16:creationId xmlns:a16="http://schemas.microsoft.com/office/drawing/2014/main" id="{122C1E14-0610-FB4E-BCD3-3BA8CADF9D02}"/>
-              </a:ext>
-            </a:extLst>
-          </p:cNvPr>
-          <p:cNvSpPr>
-            <a:spLocks noGrp="1"/>
-          </p:cNvSpPr>
-          <p:nvPr>
-            <p:ph type="title"/>
-          </p:nvPr>
-        </p:nvSpPr>
-        <p:spPr/>
-        <p:txBody>
-          <a:bodyPr/>
-          <a:lstStyle/>
-          <a:p>
-            <a:r>
-              <a:rPr lang="en-IT" dirty="0"/>
-              <a:t>Outline</a:t>
-            </a:r>
-          </a:p>
-        </p:txBody>
-      </p:sp>
-      <p:sp>
-        <p:nvSpPr>
-          <p:cNvPr id="3" name="Content Placeholder 2">
-            <a:extLst>
-              <a:ext uri="{FF2B5EF4-FFF2-40B4-BE49-F238E27FC236}">
-                <a16:creationId xmlns:a16="http://schemas.microsoft.com/office/drawing/2014/main" id="{8962CCAC-9D70-C543-BBE0-822B6CB5F5CB}"/>
-              </a:ext>
-            </a:extLst>
-          </p:cNvPr>
-          <p:cNvSpPr>
-            <a:spLocks noGrp="1"/>
-          </p:cNvSpPr>
-          <p:nvPr>
-            <p:ph idx="1"/>
-          </p:nvPr>
-        </p:nvSpPr>
-        <p:spPr>
-          <a:xfrm>
-            <a:off x="428172" y="1361167"/>
-            <a:ext cx="11213368" cy="5334907"/>
-          </a:xfrm>
-        </p:spPr>
-        <p:txBody>
-          <a:bodyPr>
-            <a:normAutofit/>
-          </a:bodyPr>
-          <a:lstStyle/>
-          <a:p>
             <a:r>
               <a:rPr lang="en-GB" dirty="0">
                 <a:solidFill>
@@ -7715,7 +7035,7 @@
 </p:sld>
 </file>
 
-<file path=ppt/slides/slide25.xml><?xml version="1.0" encoding="utf-8"?>
+<file path=ppt/slides/slide24.xml><?xml version="1.0" encoding="utf-8"?>
 <p:sld xmlns:a="http://schemas.openxmlformats.org/drawingml/2006/main" xmlns:r="http://schemas.openxmlformats.org/officeDocument/2006/relationships" xmlns:p="http://schemas.openxmlformats.org/presentationml/2006/main">
   <p:cSld>
     <p:spTree>
@@ -14123,7 +13443,7 @@
           <p:cNvPr id="2" name="Title 1">
             <a:extLst>
               <a:ext uri="{FF2B5EF4-FFF2-40B4-BE49-F238E27FC236}">
-                <a16:creationId xmlns:a16="http://schemas.microsoft.com/office/drawing/2014/main" id="{80BE60FB-C861-1E44-92E6-8F9396441CB2}"/>
+                <a16:creationId xmlns:a16="http://schemas.microsoft.com/office/drawing/2014/main" id="{122C1E14-0610-FB4E-BCD3-3BA8CADF9D02}"/>
               </a:ext>
             </a:extLst>
           </p:cNvPr>
@@ -14136,24 +13456,22 @@
         </p:nvSpPr>
         <p:spPr/>
         <p:txBody>
-          <a:bodyPr>
-            <a:normAutofit/>
-          </a:bodyPr>
+          <a:bodyPr/>
           <a:lstStyle/>
           <a:p>
             <a:r>
               <a:rPr lang="en-IT" dirty="0"/>
-              <a:t>The (required) flow in practice</a:t>
+              <a:t>Outline</a:t>
             </a:r>
           </a:p>
         </p:txBody>
       </p:sp>
       <p:sp>
         <p:nvSpPr>
-          <p:cNvPr id="4" name="Slide Number Placeholder 3">
+          <p:cNvPr id="3" name="Content Placeholder 2">
             <a:extLst>
               <a:ext uri="{FF2B5EF4-FFF2-40B4-BE49-F238E27FC236}">
-                <a16:creationId xmlns:a16="http://schemas.microsoft.com/office/drawing/2014/main" id="{C57ACF48-43BD-9049-83DA-4C0AF0AC5D28}"/>
+                <a16:creationId xmlns:a16="http://schemas.microsoft.com/office/drawing/2014/main" id="{8962CCAC-9D70-C543-BBE0-822B6CB5F5CB}"/>
               </a:ext>
             </a:extLst>
           </p:cNvPr>
@@ -14161,1072 +13479,116 @@
             <a:spLocks noGrp="1"/>
           </p:cNvSpPr>
           <p:nvPr>
-            <p:ph type="sldNum" sz="quarter" idx="12"/>
+            <p:ph idx="1"/>
           </p:nvPr>
-        </p:nvSpPr>
-        <p:spPr/>
-        <p:txBody>
-          <a:bodyPr/>
-          <a:lstStyle/>
-          <a:p>
-            <a:fld id="{31DE2C5B-556E-47B8-A792-024C2FCA4ACC}" type="slidenum">
-              <a:rPr lang="en-GB" smtClean="0"/>
-              <a:t>8</a:t>
-            </a:fld>
-            <a:endParaRPr lang="en-GB" dirty="0"/>
-          </a:p>
-        </p:txBody>
-      </p:sp>
-      <p:sp>
-        <p:nvSpPr>
-          <p:cNvPr id="23" name="Rectangle 22">
-            <a:extLst>
-              <a:ext uri="{FF2B5EF4-FFF2-40B4-BE49-F238E27FC236}">
-                <a16:creationId xmlns:a16="http://schemas.microsoft.com/office/drawing/2014/main" id="{447B6308-4B6E-CBE3-2D9A-795918D474AE}"/>
-              </a:ext>
-            </a:extLst>
-          </p:cNvPr>
-          <p:cNvSpPr/>
-          <p:nvPr/>
         </p:nvSpPr>
         <p:spPr>
           <a:xfrm>
-            <a:off x="1417320" y="1311043"/>
-            <a:ext cx="5753451" cy="383311"/>
+            <a:off x="428172" y="1361167"/>
+            <a:ext cx="11213368" cy="5334907"/>
           </a:xfrm>
-          <a:prstGeom prst="rect">
-            <a:avLst/>
-          </a:prstGeom>
-          <a:ln w="38100"/>
-        </p:spPr>
-        <p:style>
-          <a:lnRef idx="2">
-            <a:schemeClr val="accent6"/>
-          </a:lnRef>
-          <a:fillRef idx="1">
-            <a:schemeClr val="lt1"/>
-          </a:fillRef>
-          <a:effectRef idx="0">
-            <a:schemeClr val="accent6"/>
-          </a:effectRef>
-          <a:fontRef idx="minor">
-            <a:schemeClr val="dk1"/>
-          </a:fontRef>
-        </p:style>
-        <p:txBody>
-          <a:bodyPr rtlCol="0" anchor="ctr"/>
-          <a:lstStyle/>
-          <a:p>
-            <a:pPr algn="ctr"/>
-            <a:r>
-              <a:rPr lang="en-IT" dirty="0">
-                <a:latin typeface="Palatino Linotype" panose="02040502050505030304" pitchFamily="18" charset="0"/>
-              </a:rPr>
-              <a:t>Use credentials to ask for a JWT token pair</a:t>
-            </a:r>
-          </a:p>
-        </p:txBody>
-      </p:sp>
-      <p:sp>
-        <p:nvSpPr>
-          <p:cNvPr id="24" name="Rectangle 23">
-            <a:extLst>
-              <a:ext uri="{FF2B5EF4-FFF2-40B4-BE49-F238E27FC236}">
-                <a16:creationId xmlns:a16="http://schemas.microsoft.com/office/drawing/2014/main" id="{D94200A1-1176-ECD5-9518-FF1F2DC65A06}"/>
-              </a:ext>
-            </a:extLst>
-          </p:cNvPr>
-          <p:cNvSpPr/>
-          <p:nvPr/>
-        </p:nvSpPr>
-        <p:spPr>
-          <a:xfrm>
-            <a:off x="1417320" y="1956148"/>
-            <a:ext cx="5753450" cy="383311"/>
-          </a:xfrm>
-          <a:prstGeom prst="rect">
-            <a:avLst/>
-          </a:prstGeom>
-          <a:ln w="38100"/>
-        </p:spPr>
-        <p:style>
-          <a:lnRef idx="2">
-            <a:schemeClr val="accent6"/>
-          </a:lnRef>
-          <a:fillRef idx="1">
-            <a:schemeClr val="lt1"/>
-          </a:fillRef>
-          <a:effectRef idx="0">
-            <a:schemeClr val="accent6"/>
-          </a:effectRef>
-          <a:fontRef idx="minor">
-            <a:schemeClr val="dk1"/>
-          </a:fontRef>
-        </p:style>
-        <p:txBody>
-          <a:bodyPr rtlCol="0" anchor="ctr"/>
-          <a:lstStyle/>
-          <a:p>
-            <a:pPr algn="ctr"/>
-            <a:r>
-              <a:rPr lang="en-IT" dirty="0">
-                <a:latin typeface="Palatino Linotype" panose="02040502050505030304" pitchFamily="18" charset="0"/>
-              </a:rPr>
-              <a:t>Receive JWT token pair</a:t>
-            </a:r>
-          </a:p>
-        </p:txBody>
-      </p:sp>
-      <p:sp>
-        <p:nvSpPr>
-          <p:cNvPr id="25" name="Rectangle 24">
-            <a:extLst>
-              <a:ext uri="{FF2B5EF4-FFF2-40B4-BE49-F238E27FC236}">
-                <a16:creationId xmlns:a16="http://schemas.microsoft.com/office/drawing/2014/main" id="{B6D2CFE9-74EF-180D-AA3F-41BAB7CB3621}"/>
-              </a:ext>
-            </a:extLst>
-          </p:cNvPr>
-          <p:cNvSpPr/>
-          <p:nvPr/>
-        </p:nvSpPr>
-        <p:spPr>
-          <a:xfrm>
-            <a:off x="1417320" y="2528771"/>
-            <a:ext cx="5753449" cy="383312"/>
-          </a:xfrm>
-          <a:prstGeom prst="rect">
-            <a:avLst/>
-          </a:prstGeom>
-          <a:ln w="38100"/>
-        </p:spPr>
-        <p:style>
-          <a:lnRef idx="2">
-            <a:schemeClr val="accent6"/>
-          </a:lnRef>
-          <a:fillRef idx="1">
-            <a:schemeClr val="lt1"/>
-          </a:fillRef>
-          <a:effectRef idx="0">
-            <a:schemeClr val="accent6"/>
-          </a:effectRef>
-          <a:fontRef idx="minor">
-            <a:schemeClr val="dk1"/>
-          </a:fontRef>
-        </p:style>
-        <p:txBody>
-          <a:bodyPr rtlCol="0" anchor="ctr"/>
-          <a:lstStyle/>
-          <a:p>
-            <a:pPr algn="ctr"/>
-            <a:r>
-              <a:rPr lang="en-IT" dirty="0">
-                <a:latin typeface="Palatino Linotype" panose="02040502050505030304" pitchFamily="18" charset="0"/>
-              </a:rPr>
-              <a:t>Store token pair for making calls</a:t>
-            </a:r>
-          </a:p>
-        </p:txBody>
-      </p:sp>
-      <p:cxnSp>
-        <p:nvCxnSpPr>
-          <p:cNvPr id="27" name="Straight Arrow Connector 26">
-            <a:extLst>
-              <a:ext uri="{FF2B5EF4-FFF2-40B4-BE49-F238E27FC236}">
-                <a16:creationId xmlns:a16="http://schemas.microsoft.com/office/drawing/2014/main" id="{3332B27A-DC26-B91A-878E-9D1F5A3DB7ED}"/>
-              </a:ext>
-            </a:extLst>
-          </p:cNvPr>
-          <p:cNvCxnSpPr>
-            <a:cxnSpLocks/>
-            <a:stCxn id="23" idx="2"/>
-            <a:endCxn id="24" idx="0"/>
-          </p:cNvCxnSpPr>
-          <p:nvPr/>
-        </p:nvCxnSpPr>
-        <p:spPr>
-          <a:xfrm flipH="1">
-            <a:off x="4294045" y="1694354"/>
-            <a:ext cx="1" cy="261794"/>
-          </a:xfrm>
-          <a:prstGeom prst="straightConnector1">
-            <a:avLst/>
-          </a:prstGeom>
-          <a:ln>
-            <a:tailEnd type="triangle"/>
-          </a:ln>
-        </p:spPr>
-        <p:style>
-          <a:lnRef idx="1">
-            <a:schemeClr val="dk1"/>
-          </a:lnRef>
-          <a:fillRef idx="0">
-            <a:schemeClr val="dk1"/>
-          </a:fillRef>
-          <a:effectRef idx="0">
-            <a:schemeClr val="dk1"/>
-          </a:effectRef>
-          <a:fontRef idx="minor">
-            <a:schemeClr val="tx1"/>
-          </a:fontRef>
-        </p:style>
-      </p:cxnSp>
-      <p:cxnSp>
-        <p:nvCxnSpPr>
-          <p:cNvPr id="31" name="Straight Arrow Connector 30">
-            <a:extLst>
-              <a:ext uri="{FF2B5EF4-FFF2-40B4-BE49-F238E27FC236}">
-                <a16:creationId xmlns:a16="http://schemas.microsoft.com/office/drawing/2014/main" id="{94353CD1-3C6D-5E38-1300-F17E2AB6D4E5}"/>
-              </a:ext>
-            </a:extLst>
-          </p:cNvPr>
-          <p:cNvCxnSpPr>
-            <a:cxnSpLocks/>
-            <a:stCxn id="24" idx="2"/>
-            <a:endCxn id="25" idx="0"/>
-          </p:cNvCxnSpPr>
-          <p:nvPr/>
-        </p:nvCxnSpPr>
-        <p:spPr>
-          <a:xfrm>
-            <a:off x="4294045" y="2339459"/>
-            <a:ext cx="0" cy="189312"/>
-          </a:xfrm>
-          <a:prstGeom prst="straightConnector1">
-            <a:avLst/>
-          </a:prstGeom>
-          <a:ln>
-            <a:tailEnd type="triangle"/>
-          </a:ln>
-        </p:spPr>
-        <p:style>
-          <a:lnRef idx="1">
-            <a:schemeClr val="dk1"/>
-          </a:lnRef>
-          <a:fillRef idx="0">
-            <a:schemeClr val="dk1"/>
-          </a:fillRef>
-          <a:effectRef idx="0">
-            <a:schemeClr val="dk1"/>
-          </a:effectRef>
-          <a:fontRef idx="minor">
-            <a:schemeClr val="tx1"/>
-          </a:fontRef>
-        </p:style>
-      </p:cxnSp>
-      <p:sp>
-        <p:nvSpPr>
-          <p:cNvPr id="28" name="Rectangle 27">
-            <a:extLst>
-              <a:ext uri="{FF2B5EF4-FFF2-40B4-BE49-F238E27FC236}">
-                <a16:creationId xmlns:a16="http://schemas.microsoft.com/office/drawing/2014/main" id="{A97D2822-EC21-B2F1-B64A-510F99B94BCD}"/>
-              </a:ext>
-            </a:extLst>
-          </p:cNvPr>
-          <p:cNvSpPr/>
-          <p:nvPr/>
-        </p:nvSpPr>
-        <p:spPr>
-          <a:xfrm>
-            <a:off x="2878541" y="3310771"/>
-            <a:ext cx="2831004" cy="383313"/>
-          </a:xfrm>
-          <a:prstGeom prst="rect">
-            <a:avLst/>
-          </a:prstGeom>
-          <a:ln w="38100"/>
-        </p:spPr>
-        <p:style>
-          <a:lnRef idx="2">
-            <a:schemeClr val="accent6"/>
-          </a:lnRef>
-          <a:fillRef idx="1">
-            <a:schemeClr val="lt1"/>
-          </a:fillRef>
-          <a:effectRef idx="0">
-            <a:schemeClr val="accent6"/>
-          </a:effectRef>
-          <a:fontRef idx="minor">
-            <a:schemeClr val="dk1"/>
-          </a:fontRef>
-        </p:style>
-        <p:txBody>
-          <a:bodyPr rtlCol="0" anchor="ctr"/>
-          <a:lstStyle/>
-          <a:p>
-            <a:pPr algn="ctr"/>
-            <a:r>
-              <a:rPr lang="en-IT" dirty="0">
-                <a:latin typeface="Palatino Linotype" panose="02040502050505030304" pitchFamily="18" charset="0"/>
-              </a:rPr>
-              <a:t>Access token expired?</a:t>
-            </a:r>
-          </a:p>
-        </p:txBody>
-      </p:sp>
-      <p:sp>
-        <p:nvSpPr>
-          <p:cNvPr id="29" name="Rectangle 28">
-            <a:extLst>
-              <a:ext uri="{FF2B5EF4-FFF2-40B4-BE49-F238E27FC236}">
-                <a16:creationId xmlns:a16="http://schemas.microsoft.com/office/drawing/2014/main" id="{F7560081-E8BB-4EF3-7C7F-5D6D01BF0F5C}"/>
-              </a:ext>
-            </a:extLst>
-          </p:cNvPr>
-          <p:cNvSpPr/>
-          <p:nvPr/>
-        </p:nvSpPr>
-        <p:spPr>
-          <a:xfrm>
-            <a:off x="4843704" y="4881307"/>
-            <a:ext cx="5753449" cy="383312"/>
-          </a:xfrm>
-          <a:prstGeom prst="rect">
-            <a:avLst/>
-          </a:prstGeom>
-          <a:ln w="38100"/>
-        </p:spPr>
-        <p:style>
-          <a:lnRef idx="2">
-            <a:schemeClr val="accent6"/>
-          </a:lnRef>
-          <a:fillRef idx="1">
-            <a:schemeClr val="lt1"/>
-          </a:fillRef>
-          <a:effectRef idx="0">
-            <a:schemeClr val="accent6"/>
-          </a:effectRef>
-          <a:fontRef idx="minor">
-            <a:schemeClr val="dk1"/>
-          </a:fontRef>
-        </p:style>
-        <p:txBody>
-          <a:bodyPr rtlCol="0" anchor="ctr"/>
-          <a:lstStyle/>
-          <a:p>
-            <a:pPr algn="ctr"/>
-            <a:r>
-              <a:rPr lang="en-IT" dirty="0">
-                <a:latin typeface="Palatino Linotype" panose="02040502050505030304" pitchFamily="18" charset="0"/>
-              </a:rPr>
-              <a:t>Make a call to get data using access token</a:t>
-            </a:r>
-          </a:p>
-        </p:txBody>
-      </p:sp>
-      <p:cxnSp>
-        <p:nvCxnSpPr>
-          <p:cNvPr id="30" name="Straight Arrow Connector 29">
-            <a:extLst>
-              <a:ext uri="{FF2B5EF4-FFF2-40B4-BE49-F238E27FC236}">
-                <a16:creationId xmlns:a16="http://schemas.microsoft.com/office/drawing/2014/main" id="{D4BAD13C-8618-93A4-2969-85B61DB190C7}"/>
-              </a:ext>
-            </a:extLst>
-          </p:cNvPr>
-          <p:cNvCxnSpPr>
-            <a:cxnSpLocks/>
-            <a:stCxn id="25" idx="2"/>
-            <a:endCxn id="28" idx="0"/>
-          </p:cNvCxnSpPr>
-          <p:nvPr/>
-        </p:nvCxnSpPr>
-        <p:spPr>
-          <a:xfrm flipH="1">
-            <a:off x="4294043" y="2912083"/>
-            <a:ext cx="2" cy="398688"/>
-          </a:xfrm>
-          <a:prstGeom prst="straightConnector1">
-            <a:avLst/>
-          </a:prstGeom>
-          <a:ln>
-            <a:prstDash val="dash"/>
-            <a:tailEnd type="triangle"/>
-          </a:ln>
-        </p:spPr>
-        <p:style>
-          <a:lnRef idx="1">
-            <a:schemeClr val="accent3"/>
-          </a:lnRef>
-          <a:fillRef idx="0">
-            <a:schemeClr val="accent3"/>
-          </a:fillRef>
-          <a:effectRef idx="0">
-            <a:schemeClr val="accent3"/>
-          </a:effectRef>
-          <a:fontRef idx="minor">
-            <a:schemeClr val="tx1"/>
-          </a:fontRef>
-        </p:style>
-      </p:cxnSp>
-      <p:cxnSp>
-        <p:nvCxnSpPr>
-          <p:cNvPr id="38" name="Straight Arrow Connector 37">
-            <a:extLst>
-              <a:ext uri="{FF2B5EF4-FFF2-40B4-BE49-F238E27FC236}">
-                <a16:creationId xmlns:a16="http://schemas.microsoft.com/office/drawing/2014/main" id="{D51694C6-EA15-11C0-AE43-9FEFE3116949}"/>
-              </a:ext>
-            </a:extLst>
-          </p:cNvPr>
-          <p:cNvCxnSpPr>
-            <a:cxnSpLocks/>
-            <a:stCxn id="28" idx="2"/>
-            <a:endCxn id="29" idx="0"/>
-          </p:cNvCxnSpPr>
-          <p:nvPr/>
-        </p:nvCxnSpPr>
-        <p:spPr>
-          <a:xfrm>
-            <a:off x="4294043" y="3694084"/>
-            <a:ext cx="3426386" cy="1187223"/>
-          </a:xfrm>
-          <a:prstGeom prst="straightConnector1">
-            <a:avLst/>
-          </a:prstGeom>
-          <a:ln>
-            <a:tailEnd type="triangle"/>
-          </a:ln>
-        </p:spPr>
-        <p:style>
-          <a:lnRef idx="1">
-            <a:schemeClr val="dk1"/>
-          </a:lnRef>
-          <a:fillRef idx="0">
-            <a:schemeClr val="dk1"/>
-          </a:fillRef>
-          <a:effectRef idx="0">
-            <a:schemeClr val="dk1"/>
-          </a:effectRef>
-          <a:fontRef idx="minor">
-            <a:schemeClr val="tx1"/>
-          </a:fontRef>
-        </p:style>
-      </p:cxnSp>
-      <p:cxnSp>
-        <p:nvCxnSpPr>
-          <p:cNvPr id="58" name="Straight Arrow Connector 57">
-            <a:extLst>
-              <a:ext uri="{FF2B5EF4-FFF2-40B4-BE49-F238E27FC236}">
-                <a16:creationId xmlns:a16="http://schemas.microsoft.com/office/drawing/2014/main" id="{6C8F217A-C024-20CF-EC5D-56E7C6D53193}"/>
-              </a:ext>
-            </a:extLst>
-          </p:cNvPr>
-          <p:cNvCxnSpPr>
-            <a:cxnSpLocks/>
-            <a:stCxn id="28" idx="2"/>
-            <a:endCxn id="88" idx="0"/>
-          </p:cNvCxnSpPr>
-          <p:nvPr/>
-        </p:nvCxnSpPr>
-        <p:spPr>
-          <a:xfrm flipH="1">
-            <a:off x="2195449" y="3694084"/>
-            <a:ext cx="2098594" cy="1053798"/>
-          </a:xfrm>
-          <a:prstGeom prst="straightConnector1">
-            <a:avLst/>
-          </a:prstGeom>
-          <a:ln>
-            <a:tailEnd type="triangle"/>
-          </a:ln>
-        </p:spPr>
-        <p:style>
-          <a:lnRef idx="1">
-            <a:schemeClr val="dk1"/>
-          </a:lnRef>
-          <a:fillRef idx="0">
-            <a:schemeClr val="dk1"/>
-          </a:fillRef>
-          <a:effectRef idx="0">
-            <a:schemeClr val="dk1"/>
-          </a:effectRef>
-          <a:fontRef idx="minor">
-            <a:schemeClr val="tx1"/>
-          </a:fontRef>
-        </p:style>
-      </p:cxnSp>
-      <p:cxnSp>
-        <p:nvCxnSpPr>
-          <p:cNvPr id="63" name="Straight Arrow Connector 62">
-            <a:extLst>
-              <a:ext uri="{FF2B5EF4-FFF2-40B4-BE49-F238E27FC236}">
-                <a16:creationId xmlns:a16="http://schemas.microsoft.com/office/drawing/2014/main" id="{404A0A1A-02EC-0652-2DB4-9C660F5CBFFE}"/>
-              </a:ext>
-            </a:extLst>
-          </p:cNvPr>
-          <p:cNvCxnSpPr>
-            <a:cxnSpLocks/>
-            <a:stCxn id="88" idx="3"/>
-            <a:endCxn id="29" idx="1"/>
-          </p:cNvCxnSpPr>
-          <p:nvPr/>
-        </p:nvCxnSpPr>
-        <p:spPr>
-          <a:xfrm flipV="1">
-            <a:off x="3992799" y="5072963"/>
-            <a:ext cx="850905" cy="15740"/>
-          </a:xfrm>
-          <a:prstGeom prst="straightConnector1">
-            <a:avLst/>
-          </a:prstGeom>
-          <a:ln>
-            <a:tailEnd type="triangle"/>
-          </a:ln>
-        </p:spPr>
-        <p:style>
-          <a:lnRef idx="1">
-            <a:schemeClr val="dk1"/>
-          </a:lnRef>
-          <a:fillRef idx="0">
-            <a:schemeClr val="dk1"/>
-          </a:fillRef>
-          <a:effectRef idx="0">
-            <a:schemeClr val="dk1"/>
-          </a:effectRef>
-          <a:fontRef idx="minor">
-            <a:schemeClr val="tx1"/>
-          </a:fontRef>
-        </p:style>
-      </p:cxnSp>
-      <p:sp>
-        <p:nvSpPr>
-          <p:cNvPr id="66" name="Content Placeholder 2">
-            <a:extLst>
-              <a:ext uri="{FF2B5EF4-FFF2-40B4-BE49-F238E27FC236}">
-                <a16:creationId xmlns:a16="http://schemas.microsoft.com/office/drawing/2014/main" id="{AA519743-4BEF-00D3-97AE-DF78F1FBC87C}"/>
-              </a:ext>
-            </a:extLst>
-          </p:cNvPr>
-          <p:cNvSpPr txBox="1">
-            <a:spLocks/>
-          </p:cNvSpPr>
-          <p:nvPr/>
-        </p:nvSpPr>
-        <p:spPr>
-          <a:xfrm>
-            <a:off x="2195449" y="3878419"/>
-            <a:ext cx="770038" cy="365125"/>
-          </a:xfrm>
-          <a:prstGeom prst="rect">
-            <a:avLst/>
-          </a:prstGeom>
         </p:spPr>
         <p:txBody>
-          <a:bodyPr vert="horz" lIns="91440" tIns="45720" rIns="91440" bIns="45720" rtlCol="0">
+          <a:bodyPr>
             <a:normAutofit/>
           </a:bodyPr>
-          <a:lstStyle>
-            <a:lvl1pPr marL="342900" indent="-342900" algn="l" defTabSz="914400" rtl="0" eaLnBrk="1" latinLnBrk="0" hangingPunct="1">
-              <a:lnSpc>
-                <a:spcPct val="90000"/>
-              </a:lnSpc>
-              <a:spcBef>
-                <a:spcPts val="1000"/>
-              </a:spcBef>
-              <a:buClr>
-                <a:srgbClr val="00B050"/>
-              </a:buClr>
-              <a:buFont typeface="Wingdings" panose="05000000000000000000" pitchFamily="2" charset="2"/>
-              <a:buChar char="Ø"/>
-              <a:defRPr sz="2400" kern="1200">
-                <a:solidFill>
-                  <a:schemeClr val="tx1"/>
-                </a:solidFill>
-                <a:latin typeface="Palatino Linotype" panose="02040502050505030304" pitchFamily="18" charset="0"/>
-                <a:ea typeface="+mn-ea"/>
-                <a:cs typeface="+mn-cs"/>
-              </a:defRPr>
-            </a:lvl1pPr>
-            <a:lvl2pPr marL="685800" indent="-228600" algn="l" defTabSz="914400" rtl="0" eaLnBrk="1" latinLnBrk="0" hangingPunct="1">
-              <a:lnSpc>
-                <a:spcPct val="90000"/>
-              </a:lnSpc>
-              <a:spcBef>
-                <a:spcPts val="500"/>
-              </a:spcBef>
-              <a:buClr>
-                <a:srgbClr val="00B050"/>
-              </a:buClr>
-              <a:buFont typeface="Wingdings" panose="05000000000000000000" pitchFamily="2" charset="2"/>
-              <a:buChar char="§"/>
-              <a:defRPr sz="2000" kern="1200">
-                <a:solidFill>
-                  <a:schemeClr val="tx1"/>
-                </a:solidFill>
-                <a:latin typeface="Palatino Linotype" panose="02040502050505030304" pitchFamily="18" charset="0"/>
-                <a:ea typeface="+mn-ea"/>
-                <a:cs typeface="+mn-cs"/>
-              </a:defRPr>
-            </a:lvl2pPr>
-            <a:lvl3pPr marL="1143000" indent="-228600" algn="l" defTabSz="914400" rtl="0" eaLnBrk="1" latinLnBrk="0" hangingPunct="1">
-              <a:lnSpc>
-                <a:spcPct val="90000"/>
-              </a:lnSpc>
-              <a:spcBef>
-                <a:spcPts val="500"/>
-              </a:spcBef>
-              <a:buClr>
-                <a:srgbClr val="00B050"/>
-              </a:buClr>
-              <a:buFont typeface="Arial" panose="020B0604020202020204" pitchFamily="34" charset="0"/>
-              <a:buChar char="•"/>
-              <a:defRPr sz="1800" kern="1200">
-                <a:solidFill>
-                  <a:schemeClr val="tx1"/>
-                </a:solidFill>
-                <a:latin typeface="Palatino Linotype" panose="02040502050505030304" pitchFamily="18" charset="0"/>
-                <a:ea typeface="+mn-ea"/>
-                <a:cs typeface="+mn-cs"/>
-              </a:defRPr>
-            </a:lvl3pPr>
-            <a:lvl4pPr marL="1600200" indent="-228600" algn="l" defTabSz="914400" rtl="0" eaLnBrk="1" latinLnBrk="0" hangingPunct="1">
-              <a:lnSpc>
-                <a:spcPct val="90000"/>
-              </a:lnSpc>
-              <a:spcBef>
-                <a:spcPts val="500"/>
-              </a:spcBef>
-              <a:buClr>
-                <a:srgbClr val="00B050"/>
-              </a:buClr>
-              <a:buFont typeface="Courier New" panose="02070309020205020404" pitchFamily="49" charset="0"/>
-              <a:buChar char="o"/>
-              <a:defRPr sz="1600" kern="1200">
-                <a:solidFill>
-                  <a:schemeClr val="tx1"/>
-                </a:solidFill>
-                <a:latin typeface="Palatino Linotype" panose="02040502050505030304" pitchFamily="18" charset="0"/>
-                <a:ea typeface="+mn-ea"/>
-                <a:cs typeface="+mn-cs"/>
-              </a:defRPr>
-            </a:lvl4pPr>
-            <a:lvl5pPr marL="2057400" indent="-228600" algn="l" defTabSz="914400" rtl="0" eaLnBrk="1" latinLnBrk="0" hangingPunct="1">
-              <a:lnSpc>
-                <a:spcPct val="90000"/>
-              </a:lnSpc>
-              <a:spcBef>
-                <a:spcPts val="500"/>
-              </a:spcBef>
-              <a:buClr>
-                <a:srgbClr val="00B050"/>
-              </a:buClr>
-              <a:buFont typeface="Times New Roman" panose="02020603050405020304" pitchFamily="18" charset="0"/>
-              <a:buChar char="̶"/>
-              <a:defRPr sz="1600" kern="1200">
-                <a:solidFill>
-                  <a:schemeClr val="tx1"/>
-                </a:solidFill>
-                <a:latin typeface="Palatino Linotype" panose="02040502050505030304" pitchFamily="18" charset="0"/>
-                <a:ea typeface="+mn-ea"/>
-                <a:cs typeface="+mn-cs"/>
-              </a:defRPr>
-            </a:lvl5pPr>
-            <a:lvl6pPr marL="2514600" indent="-228600" algn="l" defTabSz="914400" rtl="0" eaLnBrk="1" latinLnBrk="0" hangingPunct="1">
-              <a:lnSpc>
-                <a:spcPct val="90000"/>
-              </a:lnSpc>
-              <a:spcBef>
-                <a:spcPts val="500"/>
-              </a:spcBef>
-              <a:buFont typeface="Arial" panose="020B0604020202020204" pitchFamily="34" charset="0"/>
-              <a:buChar char="•"/>
-              <a:defRPr sz="1800" kern="1200">
-                <a:solidFill>
-                  <a:schemeClr val="tx1"/>
-                </a:solidFill>
-                <a:latin typeface="+mn-lt"/>
-                <a:ea typeface="+mn-ea"/>
-                <a:cs typeface="+mn-cs"/>
-              </a:defRPr>
-            </a:lvl6pPr>
-            <a:lvl7pPr marL="2971800" indent="-228600" algn="l" defTabSz="914400" rtl="0" eaLnBrk="1" latinLnBrk="0" hangingPunct="1">
-              <a:lnSpc>
-                <a:spcPct val="90000"/>
-              </a:lnSpc>
-              <a:spcBef>
-                <a:spcPts val="500"/>
-              </a:spcBef>
-              <a:buFont typeface="Arial" panose="020B0604020202020204" pitchFamily="34" charset="0"/>
-              <a:buChar char="•"/>
-              <a:defRPr sz="1800" kern="1200">
-                <a:solidFill>
-                  <a:schemeClr val="tx1"/>
-                </a:solidFill>
-                <a:latin typeface="+mn-lt"/>
-                <a:ea typeface="+mn-ea"/>
-                <a:cs typeface="+mn-cs"/>
-              </a:defRPr>
-            </a:lvl7pPr>
-            <a:lvl8pPr marL="3429000" indent="-228600" algn="l" defTabSz="914400" rtl="0" eaLnBrk="1" latinLnBrk="0" hangingPunct="1">
-              <a:lnSpc>
-                <a:spcPct val="90000"/>
-              </a:lnSpc>
-              <a:spcBef>
-                <a:spcPts val="500"/>
-              </a:spcBef>
-              <a:buFont typeface="Arial" panose="020B0604020202020204" pitchFamily="34" charset="0"/>
-              <a:buChar char="•"/>
-              <a:defRPr sz="1800" kern="1200">
-                <a:solidFill>
-                  <a:schemeClr val="tx1"/>
-                </a:solidFill>
-                <a:latin typeface="+mn-lt"/>
-                <a:ea typeface="+mn-ea"/>
-                <a:cs typeface="+mn-cs"/>
-              </a:defRPr>
-            </a:lvl8pPr>
-            <a:lvl9pPr marL="3886200" indent="-228600" algn="l" defTabSz="914400" rtl="0" eaLnBrk="1" latinLnBrk="0" hangingPunct="1">
-              <a:lnSpc>
-                <a:spcPct val="90000"/>
-              </a:lnSpc>
-              <a:spcBef>
-                <a:spcPts val="500"/>
-              </a:spcBef>
-              <a:buFont typeface="Arial" panose="020B0604020202020204" pitchFamily="34" charset="0"/>
-              <a:buChar char="•"/>
-              <a:defRPr sz="1800" kern="1200">
-                <a:solidFill>
-                  <a:schemeClr val="tx1"/>
-                </a:solidFill>
-                <a:latin typeface="+mn-lt"/>
-                <a:ea typeface="+mn-ea"/>
-                <a:cs typeface="+mn-cs"/>
-              </a:defRPr>
-            </a:lvl9pPr>
-          </a:lstStyle>
-          <a:p>
-            <a:pPr marL="0" indent="0" algn="ctr">
-              <a:buFont typeface="Wingdings" panose="05000000000000000000" pitchFamily="2" charset="2"/>
-              <a:buNone/>
-            </a:pPr>
-            <a:r>
-              <a:rPr lang="en-IT" sz="1600" b="1" dirty="0">
-                <a:solidFill>
-                  <a:srgbClr val="C00000"/>
+          <a:lstStyle/>
+          <a:p>
+            <a:r>
+              <a:rPr lang="en-GB" dirty="0">
+                <a:solidFill>
+                  <a:schemeClr val="bg2">
+                    <a:lumMod val="90000"/>
+                  </a:schemeClr>
                 </a:solidFill>
               </a:rPr>
-              <a:t>YES</a:t>
-            </a:r>
-          </a:p>
-        </p:txBody>
-      </p:sp>
-      <p:sp>
-        <p:nvSpPr>
-          <p:cNvPr id="67" name="Content Placeholder 2">
-            <a:extLst>
-              <a:ext uri="{FF2B5EF4-FFF2-40B4-BE49-F238E27FC236}">
-                <a16:creationId xmlns:a16="http://schemas.microsoft.com/office/drawing/2014/main" id="{CAED8DAF-8693-1563-7F60-15E843CA49AB}"/>
-              </a:ext>
-            </a:extLst>
-          </p:cNvPr>
-          <p:cNvSpPr txBox="1">
-            <a:spLocks/>
-          </p:cNvSpPr>
-          <p:nvPr/>
-        </p:nvSpPr>
-        <p:spPr>
-          <a:xfrm>
-            <a:off x="5563586" y="3869406"/>
-            <a:ext cx="770038" cy="365125"/>
-          </a:xfrm>
-          <a:prstGeom prst="rect">
-            <a:avLst/>
-          </a:prstGeom>
-        </p:spPr>
-        <p:txBody>
-          <a:bodyPr vert="horz" lIns="91440" tIns="45720" rIns="91440" bIns="45720" rtlCol="0">
-            <a:normAutofit/>
-          </a:bodyPr>
-          <a:lstStyle>
-            <a:lvl1pPr marL="342900" indent="-342900" algn="l" defTabSz="914400" rtl="0" eaLnBrk="1" latinLnBrk="0" hangingPunct="1">
-              <a:lnSpc>
-                <a:spcPct val="90000"/>
-              </a:lnSpc>
-              <a:spcBef>
-                <a:spcPts val="1000"/>
-              </a:spcBef>
-              <a:buClr>
-                <a:srgbClr val="00B050"/>
-              </a:buClr>
-              <a:buFont typeface="Wingdings" panose="05000000000000000000" pitchFamily="2" charset="2"/>
-              <a:buChar char="Ø"/>
-              <a:defRPr sz="2400" kern="1200">
-                <a:solidFill>
-                  <a:schemeClr val="tx1"/>
-                </a:solidFill>
-                <a:latin typeface="Palatino Linotype" panose="02040502050505030304" pitchFamily="18" charset="0"/>
-                <a:ea typeface="+mn-ea"/>
-                <a:cs typeface="+mn-cs"/>
-              </a:defRPr>
-            </a:lvl1pPr>
-            <a:lvl2pPr marL="685800" indent="-228600" algn="l" defTabSz="914400" rtl="0" eaLnBrk="1" latinLnBrk="0" hangingPunct="1">
-              <a:lnSpc>
-                <a:spcPct val="90000"/>
-              </a:lnSpc>
-              <a:spcBef>
-                <a:spcPts val="500"/>
-              </a:spcBef>
-              <a:buClr>
-                <a:srgbClr val="00B050"/>
-              </a:buClr>
-              <a:buFont typeface="Wingdings" panose="05000000000000000000" pitchFamily="2" charset="2"/>
-              <a:buChar char="§"/>
-              <a:defRPr sz="2000" kern="1200">
-                <a:solidFill>
-                  <a:schemeClr val="tx1"/>
-                </a:solidFill>
-                <a:latin typeface="Palatino Linotype" panose="02040502050505030304" pitchFamily="18" charset="0"/>
-                <a:ea typeface="+mn-ea"/>
-                <a:cs typeface="+mn-cs"/>
-              </a:defRPr>
-            </a:lvl2pPr>
-            <a:lvl3pPr marL="1143000" indent="-228600" algn="l" defTabSz="914400" rtl="0" eaLnBrk="1" latinLnBrk="0" hangingPunct="1">
-              <a:lnSpc>
-                <a:spcPct val="90000"/>
-              </a:lnSpc>
-              <a:spcBef>
-                <a:spcPts val="500"/>
-              </a:spcBef>
-              <a:buClr>
-                <a:srgbClr val="00B050"/>
-              </a:buClr>
-              <a:buFont typeface="Arial" panose="020B0604020202020204" pitchFamily="34" charset="0"/>
-              <a:buChar char="•"/>
-              <a:defRPr sz="1800" kern="1200">
-                <a:solidFill>
-                  <a:schemeClr val="tx1"/>
-                </a:solidFill>
-                <a:latin typeface="Palatino Linotype" panose="02040502050505030304" pitchFamily="18" charset="0"/>
-                <a:ea typeface="+mn-ea"/>
-                <a:cs typeface="+mn-cs"/>
-              </a:defRPr>
-            </a:lvl3pPr>
-            <a:lvl4pPr marL="1600200" indent="-228600" algn="l" defTabSz="914400" rtl="0" eaLnBrk="1" latinLnBrk="0" hangingPunct="1">
-              <a:lnSpc>
-                <a:spcPct val="90000"/>
-              </a:lnSpc>
-              <a:spcBef>
-                <a:spcPts val="500"/>
-              </a:spcBef>
-              <a:buClr>
-                <a:srgbClr val="00B050"/>
-              </a:buClr>
-              <a:buFont typeface="Courier New" panose="02070309020205020404" pitchFamily="49" charset="0"/>
-              <a:buChar char="o"/>
-              <a:defRPr sz="1600" kern="1200">
-                <a:solidFill>
-                  <a:schemeClr val="tx1"/>
-                </a:solidFill>
-                <a:latin typeface="Palatino Linotype" panose="02040502050505030304" pitchFamily="18" charset="0"/>
-                <a:ea typeface="+mn-ea"/>
-                <a:cs typeface="+mn-cs"/>
-              </a:defRPr>
-            </a:lvl4pPr>
-            <a:lvl5pPr marL="2057400" indent="-228600" algn="l" defTabSz="914400" rtl="0" eaLnBrk="1" latinLnBrk="0" hangingPunct="1">
-              <a:lnSpc>
-                <a:spcPct val="90000"/>
-              </a:lnSpc>
-              <a:spcBef>
-                <a:spcPts val="500"/>
-              </a:spcBef>
-              <a:buClr>
-                <a:srgbClr val="00B050"/>
-              </a:buClr>
-              <a:buFont typeface="Times New Roman" panose="02020603050405020304" pitchFamily="18" charset="0"/>
-              <a:buChar char="̶"/>
-              <a:defRPr sz="1600" kern="1200">
-                <a:solidFill>
-                  <a:schemeClr val="tx1"/>
-                </a:solidFill>
-                <a:latin typeface="Palatino Linotype" panose="02040502050505030304" pitchFamily="18" charset="0"/>
-                <a:ea typeface="+mn-ea"/>
-                <a:cs typeface="+mn-cs"/>
-              </a:defRPr>
-            </a:lvl5pPr>
-            <a:lvl6pPr marL="2514600" indent="-228600" algn="l" defTabSz="914400" rtl="0" eaLnBrk="1" latinLnBrk="0" hangingPunct="1">
-              <a:lnSpc>
-                <a:spcPct val="90000"/>
-              </a:lnSpc>
-              <a:spcBef>
-                <a:spcPts val="500"/>
-              </a:spcBef>
-              <a:buFont typeface="Arial" panose="020B0604020202020204" pitchFamily="34" charset="0"/>
-              <a:buChar char="•"/>
-              <a:defRPr sz="1800" kern="1200">
-                <a:solidFill>
-                  <a:schemeClr val="tx1"/>
-                </a:solidFill>
-                <a:latin typeface="+mn-lt"/>
-                <a:ea typeface="+mn-ea"/>
-                <a:cs typeface="+mn-cs"/>
-              </a:defRPr>
-            </a:lvl6pPr>
-            <a:lvl7pPr marL="2971800" indent="-228600" algn="l" defTabSz="914400" rtl="0" eaLnBrk="1" latinLnBrk="0" hangingPunct="1">
-              <a:lnSpc>
-                <a:spcPct val="90000"/>
-              </a:lnSpc>
-              <a:spcBef>
-                <a:spcPts val="500"/>
-              </a:spcBef>
-              <a:buFont typeface="Arial" panose="020B0604020202020204" pitchFamily="34" charset="0"/>
-              <a:buChar char="•"/>
-              <a:defRPr sz="1800" kern="1200">
-                <a:solidFill>
-                  <a:schemeClr val="tx1"/>
-                </a:solidFill>
-                <a:latin typeface="+mn-lt"/>
-                <a:ea typeface="+mn-ea"/>
-                <a:cs typeface="+mn-cs"/>
-              </a:defRPr>
-            </a:lvl7pPr>
-            <a:lvl8pPr marL="3429000" indent="-228600" algn="l" defTabSz="914400" rtl="0" eaLnBrk="1" latinLnBrk="0" hangingPunct="1">
-              <a:lnSpc>
-                <a:spcPct val="90000"/>
-              </a:lnSpc>
-              <a:spcBef>
-                <a:spcPts val="500"/>
-              </a:spcBef>
-              <a:buFont typeface="Arial" panose="020B0604020202020204" pitchFamily="34" charset="0"/>
-              <a:buChar char="•"/>
-              <a:defRPr sz="1800" kern="1200">
-                <a:solidFill>
-                  <a:schemeClr val="tx1"/>
-                </a:solidFill>
-                <a:latin typeface="+mn-lt"/>
-                <a:ea typeface="+mn-ea"/>
-                <a:cs typeface="+mn-cs"/>
-              </a:defRPr>
-            </a:lvl8pPr>
-            <a:lvl9pPr marL="3886200" indent="-228600" algn="l" defTabSz="914400" rtl="0" eaLnBrk="1" latinLnBrk="0" hangingPunct="1">
-              <a:lnSpc>
-                <a:spcPct val="90000"/>
-              </a:lnSpc>
-              <a:spcBef>
-                <a:spcPts val="500"/>
-              </a:spcBef>
-              <a:buFont typeface="Arial" panose="020B0604020202020204" pitchFamily="34" charset="0"/>
-              <a:buChar char="•"/>
-              <a:defRPr sz="1800" kern="1200">
-                <a:solidFill>
-                  <a:schemeClr val="tx1"/>
-                </a:solidFill>
-                <a:latin typeface="+mn-lt"/>
-                <a:ea typeface="+mn-ea"/>
-                <a:cs typeface="+mn-cs"/>
-              </a:defRPr>
-            </a:lvl9pPr>
-          </a:lstStyle>
-          <a:p>
-            <a:pPr marL="0" indent="0" algn="ctr">
-              <a:buFont typeface="Wingdings" panose="05000000000000000000" pitchFamily="2" charset="2"/>
-              <a:buNone/>
-            </a:pPr>
-            <a:r>
-              <a:rPr lang="en-IT" sz="1600" b="1" dirty="0">
-                <a:solidFill>
-                  <a:srgbClr val="C00000"/>
+              <a:t>Recap</a:t>
+            </a:r>
+          </a:p>
+          <a:p>
+            <a:r>
+              <a:rPr lang="en-GB" dirty="0">
+                <a:solidFill>
+                  <a:schemeClr val="bg2">
+                    <a:lumMod val="90000"/>
+                  </a:schemeClr>
                 </a:solidFill>
               </a:rPr>
-              <a:t>NO</a:t>
-            </a:r>
-          </a:p>
-        </p:txBody>
-      </p:sp>
-      <p:cxnSp>
-        <p:nvCxnSpPr>
-          <p:cNvPr id="69" name="Straight Connector 68">
-            <a:extLst>
-              <a:ext uri="{FF2B5EF4-FFF2-40B4-BE49-F238E27FC236}">
-                <a16:creationId xmlns:a16="http://schemas.microsoft.com/office/drawing/2014/main" id="{9B7B55B2-D574-B610-E2A1-5C32761E9027}"/>
-              </a:ext>
-            </a:extLst>
-          </p:cNvPr>
-          <p:cNvCxnSpPr/>
-          <p:nvPr/>
-        </p:nvCxnSpPr>
-        <p:spPr>
-          <a:xfrm>
-            <a:off x="0" y="3080251"/>
-            <a:ext cx="12192000" cy="0"/>
-          </a:xfrm>
-          <a:prstGeom prst="line">
-            <a:avLst/>
-          </a:prstGeom>
-          <a:ln>
-            <a:solidFill>
-              <a:schemeClr val="bg2">
-                <a:lumMod val="90000"/>
-              </a:schemeClr>
-            </a:solidFill>
-          </a:ln>
-        </p:spPr>
-        <p:style>
-          <a:lnRef idx="1">
-            <a:schemeClr val="dk1"/>
-          </a:lnRef>
-          <a:fillRef idx="0">
-            <a:schemeClr val="dk1"/>
-          </a:fillRef>
-          <a:effectRef idx="0">
-            <a:schemeClr val="dk1"/>
-          </a:effectRef>
-          <a:fontRef idx="minor">
-            <a:schemeClr val="tx1"/>
-          </a:fontRef>
-        </p:style>
-      </p:cxnSp>
-      <p:sp>
-        <p:nvSpPr>
-          <p:cNvPr id="88" name="Rectangle 87">
-            <a:extLst>
-              <a:ext uri="{FF2B5EF4-FFF2-40B4-BE49-F238E27FC236}">
-                <a16:creationId xmlns:a16="http://schemas.microsoft.com/office/drawing/2014/main" id="{3AFA570E-D20C-8C65-48DA-B1F1029076A6}"/>
-              </a:ext>
-            </a:extLst>
-          </p:cNvPr>
-          <p:cNvSpPr/>
-          <p:nvPr/>
-        </p:nvSpPr>
-        <p:spPr>
-          <a:xfrm>
-            <a:off x="398099" y="4747882"/>
-            <a:ext cx="3594700" cy="681641"/>
-          </a:xfrm>
-          <a:prstGeom prst="rect">
-            <a:avLst/>
-          </a:prstGeom>
-          <a:ln w="38100"/>
-        </p:spPr>
-        <p:style>
-          <a:lnRef idx="2">
-            <a:schemeClr val="accent6"/>
-          </a:lnRef>
-          <a:fillRef idx="1">
-            <a:schemeClr val="lt1"/>
-          </a:fillRef>
-          <a:effectRef idx="0">
-            <a:schemeClr val="accent6"/>
-          </a:effectRef>
-          <a:fontRef idx="minor">
-            <a:schemeClr val="dk1"/>
-          </a:fontRef>
-        </p:style>
-        <p:txBody>
-          <a:bodyPr rtlCol="0" anchor="ctr"/>
-          <a:lstStyle/>
-          <a:p>
-            <a:pPr algn="ctr"/>
-            <a:r>
-              <a:rPr lang="en-IT" dirty="0">
-                <a:latin typeface="Palatino Linotype" panose="02040502050505030304" pitchFamily="18" charset="0"/>
+              <a:t>The flow</a:t>
+            </a:r>
+          </a:p>
+          <a:p>
+            <a:r>
+              <a:rPr lang="en-GB" b="1" dirty="0"/>
+              <a:t>RESTful API in practice</a:t>
+            </a:r>
+          </a:p>
+          <a:p>
+            <a:r>
+              <a:rPr lang="en-GB" dirty="0">
+                <a:solidFill>
+                  <a:schemeClr val="bg2">
+                    <a:lumMod val="90000"/>
+                  </a:schemeClr>
+                </a:solidFill>
               </a:rPr>
-              <a:t>Get a new token pair using the refresh token and store it</a:t>
-            </a:r>
+              <a:t>Case study</a:t>
+            </a:r>
+          </a:p>
+          <a:p>
+            <a:endParaRPr lang="en-GB" dirty="0">
+              <a:solidFill>
+                <a:schemeClr val="bg2">
+                  <a:lumMod val="90000"/>
+                </a:schemeClr>
+              </a:solidFill>
+            </a:endParaRPr>
+          </a:p>
+          <a:p>
+            <a:r>
+              <a:rPr lang="en-GB" dirty="0">
+                <a:solidFill>
+                  <a:schemeClr val="bg2">
+                    <a:lumMod val="90000"/>
+                  </a:schemeClr>
+                </a:solidFill>
+              </a:rPr>
+              <a:t>Exercise</a:t>
+            </a:r>
+          </a:p>
+          <a:p>
+            <a:r>
+              <a:rPr lang="en-GB" dirty="0">
+                <a:solidFill>
+                  <a:schemeClr val="bg2">
+                    <a:lumMod val="90000"/>
+                  </a:schemeClr>
+                </a:solidFill>
+              </a:rPr>
+              <a:t>Homework</a:t>
+            </a:r>
+          </a:p>
+          <a:p>
+            <a:r>
+              <a:rPr lang="en-GB" dirty="0">
+                <a:solidFill>
+                  <a:schemeClr val="bg2">
+                    <a:lumMod val="90000"/>
+                  </a:schemeClr>
+                </a:solidFill>
+              </a:rPr>
+              <a:t>Resources</a:t>
+            </a:r>
+          </a:p>
+          <a:p>
+            <a:endParaRPr lang="en-GB" dirty="0"/>
           </a:p>
         </p:txBody>
       </p:sp>
     </p:spTree>
     <p:extLst>
       <p:ext uri="{BB962C8B-B14F-4D97-AF65-F5344CB8AC3E}">
-        <p14:creationId xmlns:p14="http://schemas.microsoft.com/office/powerpoint/2010/main" val="2140494342"/>
+        <p14:creationId xmlns:p14="http://schemas.microsoft.com/office/powerpoint/2010/main" val="3047810794"/>
       </p:ext>
     </p:extLst>
   </p:cSld>
@@ -15276,17 +13638,252 @@
           <a:p>
             <a:r>
               <a:rPr lang="en-IT" dirty="0"/>
-              <a:t>Outline</a:t>
+              <a:t>RESTful API in practice</a:t>
             </a:r>
           </a:p>
         </p:txBody>
       </p:sp>
       <p:sp>
         <p:nvSpPr>
-          <p:cNvPr id="3" name="Content Placeholder 2">
+          <p:cNvPr id="26" name="Content Placeholder 2">
             <a:extLst>
               <a:ext uri="{FF2B5EF4-FFF2-40B4-BE49-F238E27FC236}">
-                <a16:creationId xmlns:a16="http://schemas.microsoft.com/office/drawing/2014/main" id="{8962CCAC-9D70-C543-BBE0-822B6CB5F5CB}"/>
+                <a16:creationId xmlns:a16="http://schemas.microsoft.com/office/drawing/2014/main" id="{BF2BC2FF-C8A6-F94B-AB5A-6AD590A7F828}"/>
+              </a:ext>
+            </a:extLst>
+          </p:cNvPr>
+          <p:cNvSpPr txBox="1">
+            <a:spLocks/>
+          </p:cNvSpPr>
+          <p:nvPr/>
+        </p:nvSpPr>
+        <p:spPr>
+          <a:xfrm>
+            <a:off x="214148" y="3540306"/>
+            <a:ext cx="11549680" cy="2376441"/>
+          </a:xfrm>
+          <a:prstGeom prst="rect">
+            <a:avLst/>
+          </a:prstGeom>
+        </p:spPr>
+        <p:txBody>
+          <a:bodyPr vert="horz" lIns="91440" tIns="45720" rIns="91440" bIns="45720" rtlCol="0" anchor="ctr">
+            <a:normAutofit/>
+          </a:bodyPr>
+          <a:lstStyle>
+            <a:lvl1pPr marL="342900" indent="-342900" algn="l" defTabSz="914400" rtl="0" eaLnBrk="1" latinLnBrk="0" hangingPunct="1">
+              <a:lnSpc>
+                <a:spcPct val="90000"/>
+              </a:lnSpc>
+              <a:spcBef>
+                <a:spcPts val="1000"/>
+              </a:spcBef>
+              <a:buClr>
+                <a:srgbClr val="00B050"/>
+              </a:buClr>
+              <a:buFont typeface="Wingdings" panose="05000000000000000000" pitchFamily="2" charset="2"/>
+              <a:buChar char="Ø"/>
+              <a:defRPr sz="2400" kern="1200">
+                <a:solidFill>
+                  <a:schemeClr val="tx1"/>
+                </a:solidFill>
+                <a:latin typeface="Palatino Linotype" panose="02040502050505030304" pitchFamily="18" charset="0"/>
+                <a:ea typeface="+mn-ea"/>
+                <a:cs typeface="+mn-cs"/>
+              </a:defRPr>
+            </a:lvl1pPr>
+            <a:lvl2pPr marL="685800" indent="-228600" algn="l" defTabSz="914400" rtl="0" eaLnBrk="1" latinLnBrk="0" hangingPunct="1">
+              <a:lnSpc>
+                <a:spcPct val="90000"/>
+              </a:lnSpc>
+              <a:spcBef>
+                <a:spcPts val="500"/>
+              </a:spcBef>
+              <a:buClr>
+                <a:srgbClr val="00B050"/>
+              </a:buClr>
+              <a:buFont typeface="Wingdings" panose="05000000000000000000" pitchFamily="2" charset="2"/>
+              <a:buChar char="§"/>
+              <a:defRPr sz="2000" kern="1200">
+                <a:solidFill>
+                  <a:schemeClr val="tx1"/>
+                </a:solidFill>
+                <a:latin typeface="Palatino Linotype" panose="02040502050505030304" pitchFamily="18" charset="0"/>
+                <a:ea typeface="+mn-ea"/>
+                <a:cs typeface="+mn-cs"/>
+              </a:defRPr>
+            </a:lvl2pPr>
+            <a:lvl3pPr marL="1143000" indent="-228600" algn="l" defTabSz="914400" rtl="0" eaLnBrk="1" latinLnBrk="0" hangingPunct="1">
+              <a:lnSpc>
+                <a:spcPct val="90000"/>
+              </a:lnSpc>
+              <a:spcBef>
+                <a:spcPts val="500"/>
+              </a:spcBef>
+              <a:buClr>
+                <a:srgbClr val="00B050"/>
+              </a:buClr>
+              <a:buFont typeface="Arial" panose="020B0604020202020204" pitchFamily="34" charset="0"/>
+              <a:buChar char="•"/>
+              <a:defRPr sz="1800" kern="1200">
+                <a:solidFill>
+                  <a:schemeClr val="tx1"/>
+                </a:solidFill>
+                <a:latin typeface="Palatino Linotype" panose="02040502050505030304" pitchFamily="18" charset="0"/>
+                <a:ea typeface="+mn-ea"/>
+                <a:cs typeface="+mn-cs"/>
+              </a:defRPr>
+            </a:lvl3pPr>
+            <a:lvl4pPr marL="1600200" indent="-228600" algn="l" defTabSz="914400" rtl="0" eaLnBrk="1" latinLnBrk="0" hangingPunct="1">
+              <a:lnSpc>
+                <a:spcPct val="90000"/>
+              </a:lnSpc>
+              <a:spcBef>
+                <a:spcPts val="500"/>
+              </a:spcBef>
+              <a:buClr>
+                <a:srgbClr val="00B050"/>
+              </a:buClr>
+              <a:buFont typeface="Courier New" panose="02070309020205020404" pitchFamily="49" charset="0"/>
+              <a:buChar char="o"/>
+              <a:defRPr sz="1600" kern="1200">
+                <a:solidFill>
+                  <a:schemeClr val="tx1"/>
+                </a:solidFill>
+                <a:latin typeface="Palatino Linotype" panose="02040502050505030304" pitchFamily="18" charset="0"/>
+                <a:ea typeface="+mn-ea"/>
+                <a:cs typeface="+mn-cs"/>
+              </a:defRPr>
+            </a:lvl4pPr>
+            <a:lvl5pPr marL="2057400" indent="-228600" algn="l" defTabSz="914400" rtl="0" eaLnBrk="1" latinLnBrk="0" hangingPunct="1">
+              <a:lnSpc>
+                <a:spcPct val="90000"/>
+              </a:lnSpc>
+              <a:spcBef>
+                <a:spcPts val="500"/>
+              </a:spcBef>
+              <a:buClr>
+                <a:srgbClr val="00B050"/>
+              </a:buClr>
+              <a:buFont typeface="Times New Roman" panose="02020603050405020304" pitchFamily="18" charset="0"/>
+              <a:buChar char="̶"/>
+              <a:defRPr sz="1600" kern="1200">
+                <a:solidFill>
+                  <a:schemeClr val="tx1"/>
+                </a:solidFill>
+                <a:latin typeface="Palatino Linotype" panose="02040502050505030304" pitchFamily="18" charset="0"/>
+                <a:ea typeface="+mn-ea"/>
+                <a:cs typeface="+mn-cs"/>
+              </a:defRPr>
+            </a:lvl5pPr>
+            <a:lvl6pPr marL="2514600" indent="-228600" algn="l" defTabSz="914400" rtl="0" eaLnBrk="1" latinLnBrk="0" hangingPunct="1">
+              <a:lnSpc>
+                <a:spcPct val="90000"/>
+              </a:lnSpc>
+              <a:spcBef>
+                <a:spcPts val="500"/>
+              </a:spcBef>
+              <a:buFont typeface="Arial" panose="020B0604020202020204" pitchFamily="34" charset="0"/>
+              <a:buChar char="•"/>
+              <a:defRPr sz="1800" kern="1200">
+                <a:solidFill>
+                  <a:schemeClr val="tx1"/>
+                </a:solidFill>
+                <a:latin typeface="+mn-lt"/>
+                <a:ea typeface="+mn-ea"/>
+                <a:cs typeface="+mn-cs"/>
+              </a:defRPr>
+            </a:lvl6pPr>
+            <a:lvl7pPr marL="2971800" indent="-228600" algn="l" defTabSz="914400" rtl="0" eaLnBrk="1" latinLnBrk="0" hangingPunct="1">
+              <a:lnSpc>
+                <a:spcPct val="90000"/>
+              </a:lnSpc>
+              <a:spcBef>
+                <a:spcPts val="500"/>
+              </a:spcBef>
+              <a:buFont typeface="Arial" panose="020B0604020202020204" pitchFamily="34" charset="0"/>
+              <a:buChar char="•"/>
+              <a:defRPr sz="1800" kern="1200">
+                <a:solidFill>
+                  <a:schemeClr val="tx1"/>
+                </a:solidFill>
+                <a:latin typeface="+mn-lt"/>
+                <a:ea typeface="+mn-ea"/>
+                <a:cs typeface="+mn-cs"/>
+              </a:defRPr>
+            </a:lvl7pPr>
+            <a:lvl8pPr marL="3429000" indent="-228600" algn="l" defTabSz="914400" rtl="0" eaLnBrk="1" latinLnBrk="0" hangingPunct="1">
+              <a:lnSpc>
+                <a:spcPct val="90000"/>
+              </a:lnSpc>
+              <a:spcBef>
+                <a:spcPts val="500"/>
+              </a:spcBef>
+              <a:buFont typeface="Arial" panose="020B0604020202020204" pitchFamily="34" charset="0"/>
+              <a:buChar char="•"/>
+              <a:defRPr sz="1800" kern="1200">
+                <a:solidFill>
+                  <a:schemeClr val="tx1"/>
+                </a:solidFill>
+                <a:latin typeface="+mn-lt"/>
+                <a:ea typeface="+mn-ea"/>
+                <a:cs typeface="+mn-cs"/>
+              </a:defRPr>
+            </a:lvl8pPr>
+            <a:lvl9pPr marL="3886200" indent="-228600" algn="l" defTabSz="914400" rtl="0" eaLnBrk="1" latinLnBrk="0" hangingPunct="1">
+              <a:lnSpc>
+                <a:spcPct val="90000"/>
+              </a:lnSpc>
+              <a:spcBef>
+                <a:spcPts val="500"/>
+              </a:spcBef>
+              <a:buFont typeface="Arial" panose="020B0604020202020204" pitchFamily="34" charset="0"/>
+              <a:buChar char="•"/>
+              <a:defRPr sz="1800" kern="1200">
+                <a:solidFill>
+                  <a:schemeClr val="tx1"/>
+                </a:solidFill>
+                <a:latin typeface="+mn-lt"/>
+                <a:ea typeface="+mn-ea"/>
+                <a:cs typeface="+mn-cs"/>
+              </a:defRPr>
+            </a:lvl9pPr>
+          </a:lstStyle>
+          <a:p>
+            <a:pPr marL="0" indent="0" algn="ctr">
+              <a:buNone/>
+            </a:pPr>
+            <a:r>
+              <a:rPr lang="en-US" b="1" dirty="0"/>
+              <a:t>&lt;METHOD&gt; &lt;HTTP or HTTPS&gt;://&lt;DOMAIN&gt;/&lt;ENDPOINT&gt;?&lt;PARAMETERS&gt; </a:t>
+            </a:r>
+          </a:p>
+          <a:p>
+            <a:pPr marL="0" indent="0" algn="ctr">
+              <a:buNone/>
+            </a:pPr>
+            <a:r>
+              <a:rPr lang="en-US" b="1" dirty="0"/>
+              <a:t>+ </a:t>
+            </a:r>
+          </a:p>
+          <a:p>
+            <a:pPr marL="0" indent="0" algn="ctr">
+              <a:buNone/>
+            </a:pPr>
+            <a:r>
+              <a:rPr lang="en-US" b="1" dirty="0"/>
+              <a:t>&lt;BODY&gt; and &lt;HEADERS&gt;</a:t>
+            </a:r>
+          </a:p>
+        </p:txBody>
+      </p:sp>
+      <p:sp>
+        <p:nvSpPr>
+          <p:cNvPr id="28" name="Content Placeholder 2">
+            <a:extLst>
+              <a:ext uri="{FF2B5EF4-FFF2-40B4-BE49-F238E27FC236}">
+                <a16:creationId xmlns:a16="http://schemas.microsoft.com/office/drawing/2014/main" id="{4093C35F-2A4D-4648-A78F-D26C9363BF9B}"/>
               </a:ext>
             </a:extLst>
           </p:cNvPr>
@@ -15299,8 +13896,8 @@
         </p:nvSpPr>
         <p:spPr>
           <a:xfrm>
-            <a:off x="428172" y="1361167"/>
-            <a:ext cx="11213368" cy="5334907"/>
+            <a:off x="428172" y="1288595"/>
+            <a:ext cx="11213368" cy="2761253"/>
           </a:xfrm>
         </p:spPr>
         <p:txBody>
@@ -15310,100 +13907,283 @@
           <a:lstStyle/>
           <a:p>
             <a:r>
-              <a:rPr lang="en-GB" dirty="0">
-                <a:solidFill>
-                  <a:schemeClr val="bg2">
-                    <a:lumMod val="90000"/>
-                  </a:schemeClr>
-                </a:solidFill>
-              </a:rPr>
-              <a:t>Recap</a:t>
-            </a:r>
-          </a:p>
-          <a:p>
-            <a:r>
-              <a:rPr lang="en-GB" dirty="0">
-                <a:solidFill>
-                  <a:schemeClr val="bg2">
-                    <a:lumMod val="90000"/>
-                  </a:schemeClr>
-                </a:solidFill>
-              </a:rPr>
-              <a:t>The flow</a:t>
-            </a:r>
-          </a:p>
-          <a:p>
+              <a:rPr lang="en-GB" dirty="0"/>
+              <a:t>From the practical point of view, RESTful API can be used via http/https following three steps:</a:t>
+            </a:r>
+          </a:p>
+          <a:p>
+            <a:pPr lvl="1"/>
+            <a:r>
+              <a:rPr lang="en-GB" dirty="0"/>
+              <a:t>Step 1: Send an http/https request to the RESTful API</a:t>
+            </a:r>
+          </a:p>
+          <a:p>
+            <a:pPr lvl="1"/>
+            <a:r>
+              <a:rPr lang="en-GB" dirty="0"/>
+              <a:t>Step 2: Await for the response</a:t>
+            </a:r>
+          </a:p>
+          <a:p>
+            <a:pPr lvl="1"/>
+            <a:r>
+              <a:rPr lang="en-GB" dirty="0"/>
+              <a:t>Step 3: Process the response (usually in a JSON format)</a:t>
+            </a:r>
+          </a:p>
+          <a:p>
+            <a:pPr lvl="1"/>
+            <a:endParaRPr lang="en-GB" dirty="0"/>
+          </a:p>
+          <a:p>
+            <a:r>
+              <a:rPr lang="en-GB" dirty="0"/>
+              <a:t>The http/https request has the following structure:</a:t>
+            </a:r>
+          </a:p>
+        </p:txBody>
+      </p:sp>
+      <p:sp>
+        <p:nvSpPr>
+          <p:cNvPr id="30" name="Content Placeholder 2">
+            <a:extLst>
+              <a:ext uri="{FF2B5EF4-FFF2-40B4-BE49-F238E27FC236}">
+                <a16:creationId xmlns:a16="http://schemas.microsoft.com/office/drawing/2014/main" id="{1201FA3F-A09A-234D-AEF1-050D16E6F018}"/>
+              </a:ext>
+            </a:extLst>
+          </p:cNvPr>
+          <p:cNvSpPr txBox="1">
+            <a:spLocks/>
+          </p:cNvSpPr>
+          <p:nvPr/>
+        </p:nvSpPr>
+        <p:spPr>
+          <a:xfrm>
+            <a:off x="428172" y="5610404"/>
+            <a:ext cx="11817168" cy="1085670"/>
+          </a:xfrm>
+          <a:prstGeom prst="rect">
+            <a:avLst/>
+          </a:prstGeom>
+        </p:spPr>
+        <p:txBody>
+          <a:bodyPr vert="horz" lIns="91440" tIns="45720" rIns="91440" bIns="45720" rtlCol="0">
+            <a:normAutofit fontScale="92500" lnSpcReduction="20000"/>
+          </a:bodyPr>
+          <a:lstStyle>
+            <a:lvl1pPr marL="342900" indent="-342900" algn="l" defTabSz="914400" rtl="0" eaLnBrk="1" latinLnBrk="0" hangingPunct="1">
+              <a:lnSpc>
+                <a:spcPct val="90000"/>
+              </a:lnSpc>
+              <a:spcBef>
+                <a:spcPts val="1000"/>
+              </a:spcBef>
+              <a:buClr>
+                <a:srgbClr val="00B050"/>
+              </a:buClr>
+              <a:buFont typeface="Wingdings" panose="05000000000000000000" pitchFamily="2" charset="2"/>
+              <a:buChar char="Ø"/>
+              <a:defRPr sz="2400" kern="1200">
+                <a:solidFill>
+                  <a:schemeClr val="tx1"/>
+                </a:solidFill>
+                <a:latin typeface="Palatino Linotype" panose="02040502050505030304" pitchFamily="18" charset="0"/>
+                <a:ea typeface="+mn-ea"/>
+                <a:cs typeface="+mn-cs"/>
+              </a:defRPr>
+            </a:lvl1pPr>
+            <a:lvl2pPr marL="685800" indent="-228600" algn="l" defTabSz="914400" rtl="0" eaLnBrk="1" latinLnBrk="0" hangingPunct="1">
+              <a:lnSpc>
+                <a:spcPct val="90000"/>
+              </a:lnSpc>
+              <a:spcBef>
+                <a:spcPts val="500"/>
+              </a:spcBef>
+              <a:buClr>
+                <a:srgbClr val="00B050"/>
+              </a:buClr>
+              <a:buFont typeface="Wingdings" panose="05000000000000000000" pitchFamily="2" charset="2"/>
+              <a:buChar char="§"/>
+              <a:defRPr sz="2000" kern="1200">
+                <a:solidFill>
+                  <a:schemeClr val="tx1"/>
+                </a:solidFill>
+                <a:latin typeface="Palatino Linotype" panose="02040502050505030304" pitchFamily="18" charset="0"/>
+                <a:ea typeface="+mn-ea"/>
+                <a:cs typeface="+mn-cs"/>
+              </a:defRPr>
+            </a:lvl2pPr>
+            <a:lvl3pPr marL="1143000" indent="-228600" algn="l" defTabSz="914400" rtl="0" eaLnBrk="1" latinLnBrk="0" hangingPunct="1">
+              <a:lnSpc>
+                <a:spcPct val="90000"/>
+              </a:lnSpc>
+              <a:spcBef>
+                <a:spcPts val="500"/>
+              </a:spcBef>
+              <a:buClr>
+                <a:srgbClr val="00B050"/>
+              </a:buClr>
+              <a:buFont typeface="Arial" panose="020B0604020202020204" pitchFamily="34" charset="0"/>
+              <a:buChar char="•"/>
+              <a:defRPr sz="1800" kern="1200">
+                <a:solidFill>
+                  <a:schemeClr val="tx1"/>
+                </a:solidFill>
+                <a:latin typeface="Palatino Linotype" panose="02040502050505030304" pitchFamily="18" charset="0"/>
+                <a:ea typeface="+mn-ea"/>
+                <a:cs typeface="+mn-cs"/>
+              </a:defRPr>
+            </a:lvl3pPr>
+            <a:lvl4pPr marL="1600200" indent="-228600" algn="l" defTabSz="914400" rtl="0" eaLnBrk="1" latinLnBrk="0" hangingPunct="1">
+              <a:lnSpc>
+                <a:spcPct val="90000"/>
+              </a:lnSpc>
+              <a:spcBef>
+                <a:spcPts val="500"/>
+              </a:spcBef>
+              <a:buClr>
+                <a:srgbClr val="00B050"/>
+              </a:buClr>
+              <a:buFont typeface="Courier New" panose="02070309020205020404" pitchFamily="49" charset="0"/>
+              <a:buChar char="o"/>
+              <a:defRPr sz="1600" kern="1200">
+                <a:solidFill>
+                  <a:schemeClr val="tx1"/>
+                </a:solidFill>
+                <a:latin typeface="Palatino Linotype" panose="02040502050505030304" pitchFamily="18" charset="0"/>
+                <a:ea typeface="+mn-ea"/>
+                <a:cs typeface="+mn-cs"/>
+              </a:defRPr>
+            </a:lvl4pPr>
+            <a:lvl5pPr marL="2057400" indent="-228600" algn="l" defTabSz="914400" rtl="0" eaLnBrk="1" latinLnBrk="0" hangingPunct="1">
+              <a:lnSpc>
+                <a:spcPct val="90000"/>
+              </a:lnSpc>
+              <a:spcBef>
+                <a:spcPts val="500"/>
+              </a:spcBef>
+              <a:buClr>
+                <a:srgbClr val="00B050"/>
+              </a:buClr>
+              <a:buFont typeface="Times New Roman" panose="02020603050405020304" pitchFamily="18" charset="0"/>
+              <a:buChar char="̶"/>
+              <a:defRPr sz="1600" kern="1200">
+                <a:solidFill>
+                  <a:schemeClr val="tx1"/>
+                </a:solidFill>
+                <a:latin typeface="Palatino Linotype" panose="02040502050505030304" pitchFamily="18" charset="0"/>
+                <a:ea typeface="+mn-ea"/>
+                <a:cs typeface="+mn-cs"/>
+              </a:defRPr>
+            </a:lvl5pPr>
+            <a:lvl6pPr marL="2514600" indent="-228600" algn="l" defTabSz="914400" rtl="0" eaLnBrk="1" latinLnBrk="0" hangingPunct="1">
+              <a:lnSpc>
+                <a:spcPct val="90000"/>
+              </a:lnSpc>
+              <a:spcBef>
+                <a:spcPts val="500"/>
+              </a:spcBef>
+              <a:buFont typeface="Arial" panose="020B0604020202020204" pitchFamily="34" charset="0"/>
+              <a:buChar char="•"/>
+              <a:defRPr sz="1800" kern="1200">
+                <a:solidFill>
+                  <a:schemeClr val="tx1"/>
+                </a:solidFill>
+                <a:latin typeface="+mn-lt"/>
+                <a:ea typeface="+mn-ea"/>
+                <a:cs typeface="+mn-cs"/>
+              </a:defRPr>
+            </a:lvl6pPr>
+            <a:lvl7pPr marL="2971800" indent="-228600" algn="l" defTabSz="914400" rtl="0" eaLnBrk="1" latinLnBrk="0" hangingPunct="1">
+              <a:lnSpc>
+                <a:spcPct val="90000"/>
+              </a:lnSpc>
+              <a:spcBef>
+                <a:spcPts val="500"/>
+              </a:spcBef>
+              <a:buFont typeface="Arial" panose="020B0604020202020204" pitchFamily="34" charset="0"/>
+              <a:buChar char="•"/>
+              <a:defRPr sz="1800" kern="1200">
+                <a:solidFill>
+                  <a:schemeClr val="tx1"/>
+                </a:solidFill>
+                <a:latin typeface="+mn-lt"/>
+                <a:ea typeface="+mn-ea"/>
+                <a:cs typeface="+mn-cs"/>
+              </a:defRPr>
+            </a:lvl7pPr>
+            <a:lvl8pPr marL="3429000" indent="-228600" algn="l" defTabSz="914400" rtl="0" eaLnBrk="1" latinLnBrk="0" hangingPunct="1">
+              <a:lnSpc>
+                <a:spcPct val="90000"/>
+              </a:lnSpc>
+              <a:spcBef>
+                <a:spcPts val="500"/>
+              </a:spcBef>
+              <a:buFont typeface="Arial" panose="020B0604020202020204" pitchFamily="34" charset="0"/>
+              <a:buChar char="•"/>
+              <a:defRPr sz="1800" kern="1200">
+                <a:solidFill>
+                  <a:schemeClr val="tx1"/>
+                </a:solidFill>
+                <a:latin typeface="+mn-lt"/>
+                <a:ea typeface="+mn-ea"/>
+                <a:cs typeface="+mn-cs"/>
+              </a:defRPr>
+            </a:lvl8pPr>
+            <a:lvl9pPr marL="3886200" indent="-228600" algn="l" defTabSz="914400" rtl="0" eaLnBrk="1" latinLnBrk="0" hangingPunct="1">
+              <a:lnSpc>
+                <a:spcPct val="90000"/>
+              </a:lnSpc>
+              <a:spcBef>
+                <a:spcPts val="500"/>
+              </a:spcBef>
+              <a:buFont typeface="Arial" panose="020B0604020202020204" pitchFamily="34" charset="0"/>
+              <a:buChar char="•"/>
+              <a:defRPr sz="1800" kern="1200">
+                <a:solidFill>
+                  <a:schemeClr val="tx1"/>
+                </a:solidFill>
+                <a:latin typeface="+mn-lt"/>
+                <a:ea typeface="+mn-ea"/>
+                <a:cs typeface="+mn-cs"/>
+              </a:defRPr>
+            </a:lvl9pPr>
+          </a:lstStyle>
+          <a:p>
+            <a:r>
+              <a:rPr lang="en-GB" dirty="0"/>
+              <a:t>&lt;METHOD&gt; and &lt;ENDPOINT&gt; defines the so-called </a:t>
+            </a:r>
             <a:r>
               <a:rPr lang="en-GB" b="1" dirty="0"/>
-              <a:t>RESTful API in practice</a:t>
-            </a:r>
-          </a:p>
-          <a:p>
-            <a:r>
-              <a:rPr lang="en-GB" dirty="0">
-                <a:solidFill>
-                  <a:schemeClr val="bg2">
-                    <a:lumMod val="90000"/>
-                  </a:schemeClr>
-                </a:solidFill>
-              </a:rPr>
-              <a:t>Case study</a:t>
-            </a:r>
-          </a:p>
-          <a:p>
-            <a:endParaRPr lang="en-GB" dirty="0">
-              <a:solidFill>
-                <a:schemeClr val="bg2">
-                  <a:lumMod val="90000"/>
-                </a:schemeClr>
-              </a:solidFill>
-            </a:endParaRPr>
-          </a:p>
-          <a:p>
-            <a:r>
-              <a:rPr lang="en-GB" dirty="0">
-                <a:solidFill>
-                  <a:schemeClr val="bg2">
-                    <a:lumMod val="90000"/>
-                  </a:schemeClr>
-                </a:solidFill>
-              </a:rPr>
-              <a:t>Exercise</a:t>
-            </a:r>
-          </a:p>
-          <a:p>
-            <a:r>
-              <a:rPr lang="en-GB" dirty="0">
-                <a:solidFill>
-                  <a:schemeClr val="bg2">
-                    <a:lumMod val="90000"/>
-                  </a:schemeClr>
-                </a:solidFill>
-              </a:rPr>
-              <a:t>Homework</a:t>
-            </a:r>
-          </a:p>
-          <a:p>
-            <a:r>
-              <a:rPr lang="en-GB" dirty="0">
-                <a:solidFill>
-                  <a:schemeClr val="bg2">
-                    <a:lumMod val="90000"/>
-                  </a:schemeClr>
-                </a:solidFill>
-              </a:rPr>
-              <a:t>Resources</a:t>
-            </a:r>
-          </a:p>
-          <a:p>
-            <a:endParaRPr lang="en-GB" dirty="0"/>
+              <a:t>route, e.g.:</a:t>
+            </a:r>
+          </a:p>
+          <a:p>
+            <a:pPr marL="0" indent="0">
+              <a:buNone/>
+            </a:pPr>
+            <a:r>
+              <a:rPr lang="en-GB" b="1" dirty="0"/>
+              <a:t>	GET /heartrate/today/</a:t>
+            </a:r>
+          </a:p>
+          <a:p>
+            <a:pPr marL="0" indent="0">
+              <a:buNone/>
+            </a:pPr>
+            <a:r>
+              <a:rPr lang="en-GB" b="1" dirty="0"/>
+              <a:t>	DELETE /user/1</a:t>
+            </a:r>
           </a:p>
         </p:txBody>
       </p:sp>
     </p:spTree>
     <p:extLst>
       <p:ext uri="{BB962C8B-B14F-4D97-AF65-F5344CB8AC3E}">
-        <p14:creationId xmlns:p14="http://schemas.microsoft.com/office/powerpoint/2010/main" val="3047810794"/>
+        <p14:creationId xmlns:p14="http://schemas.microsoft.com/office/powerpoint/2010/main" val="2468140370"/>
       </p:ext>
     </p:extLst>
   </p:cSld>

</xml_diff>